<commit_message>
Made all images smaller
</commit_message>
<xml_diff>
--- a/theory/dcm/models/DCM model images.pptx
+++ b/theory/dcm/models/DCM model images.pptx
@@ -105,6 +105,11 @@
       </a:defRPr>
     </a:lvl9pPr>
   </p:defaultTextStyle>
+  <p:extLst>
+    <p:ext uri="{EFAFB233-063F-42B5-8137-9DF3F51BA10A}">
+      <p15:sldGuideLst xmlns:p15="http://schemas.microsoft.com/office/powerpoint/2012/main"/>
+    </p:ext>
+  </p:extLst>
 </p:presentation>
 </file>
 
@@ -3077,1195 +3082,724 @@
           <a:chExt cx="0" cy="0"/>
         </a:xfrm>
       </p:grpSpPr>
-      <p:sp>
-        <p:nvSpPr>
-          <p:cNvPr id="75" name="Arc 74"/>
-          <p:cNvSpPr/>
+      <p:grpSp>
+        <p:nvGrpSpPr>
+          <p:cNvPr id="3" name="Group 2"/>
+          <p:cNvGrpSpPr/>
           <p:nvPr/>
-        </p:nvSpPr>
-        <p:spPr>
-          <a:xfrm rot="4386381">
-            <a:off x="8445856" y="2781650"/>
-            <a:ext cx="451817" cy="487063"/>
+        </p:nvGrpSpPr>
+        <p:grpSpPr>
+          <a:xfrm>
+            <a:off x="6706117" y="631364"/>
+            <a:ext cx="1962224" cy="1834817"/>
+            <a:chOff x="5903528" y="441879"/>
+            <a:chExt cx="3617783" cy="3382881"/>
           </a:xfrm>
-          <a:prstGeom prst="arc">
-            <a:avLst>
-              <a:gd name="adj1" fmla="val 10278105"/>
-              <a:gd name="adj2" fmla="val 1849105"/>
-            </a:avLst>
-          </a:prstGeom>
-          <a:ln w="38100">
+        </p:grpSpPr>
+        <p:sp>
+          <p:nvSpPr>
+            <p:cNvPr id="75" name="Arc 74"/>
+            <p:cNvSpPr/>
+            <p:nvPr/>
+          </p:nvSpPr>
+          <p:spPr>
+            <a:xfrm rot="4386381">
+              <a:off x="8445856" y="2781650"/>
+              <a:ext cx="451817" cy="487063"/>
+            </a:xfrm>
+            <a:prstGeom prst="arc">
+              <a:avLst>
+                <a:gd name="adj1" fmla="val 10278105"/>
+                <a:gd name="adj2" fmla="val 1849105"/>
+              </a:avLst>
+            </a:prstGeom>
+            <a:ln w="38100">
+              <a:solidFill>
+                <a:srgbClr val="38528C"/>
+              </a:solidFill>
+              <a:tailEnd type="triangle"/>
+            </a:ln>
+          </p:spPr>
+          <p:style>
+            <a:lnRef idx="1">
+              <a:schemeClr val="accent1"/>
+            </a:lnRef>
+            <a:fillRef idx="0">
+              <a:schemeClr val="accent1"/>
+            </a:fillRef>
+            <a:effectRef idx="0">
+              <a:schemeClr val="accent1"/>
+            </a:effectRef>
+            <a:fontRef idx="minor">
+              <a:schemeClr val="tx1"/>
+            </a:fontRef>
+          </p:style>
+          <p:txBody>
+            <a:bodyPr rtlCol="0" anchor="ctr"/>
+            <a:lstStyle/>
+            <a:p>
+              <a:pPr algn="ctr"/>
+              <a:endParaRPr lang="en-GB" sz="1200"/>
+            </a:p>
+          </p:txBody>
+        </p:sp>
+        <p:sp>
+          <p:nvSpPr>
+            <p:cNvPr id="76" name="Arc 75"/>
+            <p:cNvSpPr/>
+            <p:nvPr/>
+          </p:nvSpPr>
+          <p:spPr>
+            <a:xfrm rot="3524505">
+              <a:off x="8445858" y="1241471"/>
+              <a:ext cx="451817" cy="487063"/>
+            </a:xfrm>
+            <a:prstGeom prst="arc">
+              <a:avLst>
+                <a:gd name="adj1" fmla="val 10278105"/>
+                <a:gd name="adj2" fmla="val 1849105"/>
+              </a:avLst>
+            </a:prstGeom>
+            <a:ln w="38100">
+              <a:solidFill>
+                <a:srgbClr val="38528C"/>
+              </a:solidFill>
+              <a:tailEnd type="triangle"/>
+            </a:ln>
+          </p:spPr>
+          <p:style>
+            <a:lnRef idx="1">
+              <a:schemeClr val="accent1"/>
+            </a:lnRef>
+            <a:fillRef idx="0">
+              <a:schemeClr val="accent1"/>
+            </a:fillRef>
+            <a:effectRef idx="0">
+              <a:schemeClr val="accent1"/>
+            </a:effectRef>
+            <a:fontRef idx="minor">
+              <a:schemeClr val="tx1"/>
+            </a:fontRef>
+          </p:style>
+          <p:txBody>
+            <a:bodyPr rtlCol="0" anchor="ctr"/>
+            <a:lstStyle/>
+            <a:p>
+              <a:pPr algn="ctr"/>
+              <a:endParaRPr lang="en-GB" sz="1200"/>
+            </a:p>
+          </p:txBody>
+        </p:sp>
+        <p:cxnSp>
+          <p:nvCxnSpPr>
+            <p:cNvPr id="34" name="Straight Arrow Connector 33"/>
+            <p:cNvCxnSpPr/>
+            <p:nvPr/>
+          </p:nvCxnSpPr>
+          <p:spPr>
+            <a:xfrm flipV="1">
+              <a:off x="7976010" y="1907943"/>
+              <a:ext cx="0" cy="874883"/>
+            </a:xfrm>
+            <a:prstGeom prst="straightConnector1">
+              <a:avLst/>
+            </a:prstGeom>
+            <a:ln w="38100">
+              <a:solidFill>
+                <a:srgbClr val="38528C"/>
+              </a:solidFill>
+              <a:tailEnd type="triangle"/>
+            </a:ln>
+          </p:spPr>
+          <p:style>
+            <a:lnRef idx="1">
+              <a:schemeClr val="accent1"/>
+            </a:lnRef>
+            <a:fillRef idx="0">
+              <a:schemeClr val="accent1"/>
+            </a:fillRef>
+            <a:effectRef idx="0">
+              <a:schemeClr val="accent1"/>
+            </a:effectRef>
+            <a:fontRef idx="minor">
+              <a:schemeClr val="tx1"/>
+            </a:fontRef>
+          </p:style>
+        </p:cxnSp>
+        <p:cxnSp>
+          <p:nvCxnSpPr>
+            <p:cNvPr id="35" name="Straight Arrow Connector 34"/>
+            <p:cNvCxnSpPr/>
+            <p:nvPr/>
+          </p:nvCxnSpPr>
+          <p:spPr>
+            <a:xfrm>
+              <a:off x="8546862" y="1793643"/>
+              <a:ext cx="0" cy="874883"/>
+            </a:xfrm>
+            <a:prstGeom prst="straightConnector1">
+              <a:avLst/>
+            </a:prstGeom>
+            <a:ln w="38100">
+              <a:solidFill>
+                <a:srgbClr val="38528C"/>
+              </a:solidFill>
+              <a:tailEnd type="triangle"/>
+            </a:ln>
+          </p:spPr>
+          <p:style>
+            <a:lnRef idx="1">
+              <a:schemeClr val="accent1"/>
+            </a:lnRef>
+            <a:fillRef idx="0">
+              <a:schemeClr val="accent1"/>
+            </a:fillRef>
+            <a:effectRef idx="0">
+              <a:schemeClr val="accent1"/>
+            </a:effectRef>
+            <a:fontRef idx="minor">
+              <a:schemeClr val="tx1"/>
+            </a:fontRef>
+          </p:style>
+        </p:cxnSp>
+        <p:sp>
+          <p:nvSpPr>
+            <p:cNvPr id="36" name="Oval 35"/>
+            <p:cNvSpPr/>
+            <p:nvPr/>
+          </p:nvSpPr>
+          <p:spPr>
+            <a:xfrm>
+              <a:off x="7857782" y="1168063"/>
+              <a:ext cx="807308" cy="807308"/>
+            </a:xfrm>
+            <a:prstGeom prst="ellipse">
+              <a:avLst/>
+            </a:prstGeom>
+            <a:solidFill>
+              <a:srgbClr val="99DF8D"/>
+            </a:solidFill>
+            <a:ln w="28575">
+              <a:solidFill>
+                <a:srgbClr val="187509"/>
+              </a:solidFill>
+            </a:ln>
+          </p:spPr>
+          <p:style>
+            <a:lnRef idx="2">
+              <a:schemeClr val="accent1">
+                <a:shade val="50000"/>
+              </a:schemeClr>
+            </a:lnRef>
+            <a:fillRef idx="1">
+              <a:schemeClr val="accent1"/>
+            </a:fillRef>
+            <a:effectRef idx="0">
+              <a:schemeClr val="accent1"/>
+            </a:effectRef>
+            <a:fontRef idx="minor">
+              <a:schemeClr val="lt1"/>
+            </a:fontRef>
+          </p:style>
+          <p:txBody>
+            <a:bodyPr rtlCol="0" anchor="ctr"/>
+            <a:lstStyle/>
+            <a:p>
+              <a:pPr algn="ctr"/>
+              <a:endParaRPr lang="en-GB" sz="1200"/>
+            </a:p>
+          </p:txBody>
+        </p:sp>
+        <p:sp>
+          <p:nvSpPr>
+            <p:cNvPr id="37" name="Oval 36"/>
+            <p:cNvSpPr/>
+            <p:nvPr/>
+          </p:nvSpPr>
+          <p:spPr>
+            <a:xfrm>
+              <a:off x="7857782" y="2613798"/>
+              <a:ext cx="807308" cy="807308"/>
+            </a:xfrm>
+            <a:prstGeom prst="ellipse">
+              <a:avLst/>
+            </a:prstGeom>
+            <a:solidFill>
+              <a:srgbClr val="99DF8D"/>
+            </a:solidFill>
+            <a:ln w="28575">
+              <a:solidFill>
+                <a:srgbClr val="187509"/>
+              </a:solidFill>
+            </a:ln>
+          </p:spPr>
+          <p:style>
+            <a:lnRef idx="2">
+              <a:schemeClr val="accent1">
+                <a:shade val="50000"/>
+              </a:schemeClr>
+            </a:lnRef>
+            <a:fillRef idx="1">
+              <a:schemeClr val="accent1"/>
+            </a:fillRef>
+            <a:effectRef idx="0">
+              <a:schemeClr val="accent1"/>
+            </a:effectRef>
+            <a:fontRef idx="minor">
+              <a:schemeClr val="lt1"/>
+            </a:fontRef>
+          </p:style>
+          <p:txBody>
+            <a:bodyPr rtlCol="0" anchor="ctr"/>
+            <a:lstStyle/>
+            <a:p>
+              <a:pPr algn="ctr"/>
+              <a:endParaRPr lang="en-GB" sz="1200"/>
+            </a:p>
+          </p:txBody>
+        </p:sp>
+        <p:cxnSp>
+          <p:nvCxnSpPr>
+            <p:cNvPr id="39" name="Straight Connector 38"/>
+            <p:cNvCxnSpPr/>
+            <p:nvPr/>
+          </p:nvCxnSpPr>
+          <p:spPr>
+            <a:xfrm>
+              <a:off x="7025761" y="2536460"/>
+              <a:ext cx="950249" cy="0"/>
+            </a:xfrm>
+            <a:prstGeom prst="line">
+              <a:avLst/>
+            </a:prstGeom>
+            <a:ln w="38100">
+              <a:solidFill>
+                <a:srgbClr val="D1A245"/>
+              </a:solidFill>
+              <a:tailEnd type="oval"/>
+            </a:ln>
+          </p:spPr>
+          <p:style>
+            <a:lnRef idx="1">
+              <a:schemeClr val="accent1"/>
+            </a:lnRef>
+            <a:fillRef idx="0">
+              <a:schemeClr val="accent1"/>
+            </a:fillRef>
+            <a:effectRef idx="0">
+              <a:schemeClr val="accent1"/>
+            </a:effectRef>
+            <a:fontRef idx="minor">
+              <a:schemeClr val="tx1"/>
+            </a:fontRef>
+          </p:style>
+        </p:cxnSp>
+        <p:sp>
+          <p:nvSpPr>
+            <p:cNvPr id="40" name="Rectangle 39"/>
+            <p:cNvSpPr/>
+            <p:nvPr/>
+          </p:nvSpPr>
+          <p:spPr>
+            <a:xfrm>
+              <a:off x="9117657" y="1622522"/>
+              <a:ext cx="403654" cy="403654"/>
+            </a:xfrm>
+            <a:prstGeom prst="rect">
+              <a:avLst/>
+            </a:prstGeom>
             <a:solidFill>
               <a:srgbClr val="38528C"/>
             </a:solidFill>
-            <a:tailEnd type="triangle"/>
-          </a:ln>
-        </p:spPr>
-        <p:style>
-          <a:lnRef idx="1">
-            <a:schemeClr val="accent1"/>
-          </a:lnRef>
-          <a:fillRef idx="0">
-            <a:schemeClr val="accent1"/>
-          </a:fillRef>
-          <a:effectRef idx="0">
-            <a:schemeClr val="accent1"/>
-          </a:effectRef>
-          <a:fontRef idx="minor">
-            <a:schemeClr val="tx1"/>
-          </a:fontRef>
-        </p:style>
-        <p:txBody>
-          <a:bodyPr rtlCol="0" anchor="ctr"/>
-          <a:lstStyle/>
-          <a:p>
-            <a:pPr algn="ctr"/>
-            <a:endParaRPr lang="en-GB"/>
-          </a:p>
-        </p:txBody>
-      </p:sp>
-      <p:sp>
-        <p:nvSpPr>
-          <p:cNvPr id="76" name="Arc 75"/>
-          <p:cNvSpPr/>
-          <p:nvPr/>
-        </p:nvSpPr>
-        <p:spPr>
-          <a:xfrm rot="3524505">
-            <a:off x="8445858" y="1241471"/>
-            <a:ext cx="451817" cy="487063"/>
-          </a:xfrm>
-          <a:prstGeom prst="arc">
-            <a:avLst>
-              <a:gd name="adj1" fmla="val 10278105"/>
-              <a:gd name="adj2" fmla="val 1849105"/>
-            </a:avLst>
-          </a:prstGeom>
-          <a:ln w="38100">
+            <a:ln>
+              <a:noFill/>
+            </a:ln>
+          </p:spPr>
+          <p:style>
+            <a:lnRef idx="2">
+              <a:schemeClr val="accent1">
+                <a:shade val="50000"/>
+              </a:schemeClr>
+            </a:lnRef>
+            <a:fillRef idx="1">
+              <a:schemeClr val="accent1"/>
+            </a:fillRef>
+            <a:effectRef idx="0">
+              <a:schemeClr val="accent1"/>
+            </a:effectRef>
+            <a:fontRef idx="minor">
+              <a:schemeClr val="lt1"/>
+            </a:fontRef>
+          </p:style>
+          <p:txBody>
+            <a:bodyPr rtlCol="0" anchor="ctr"/>
+            <a:lstStyle/>
+            <a:p>
+              <a:pPr algn="ctr"/>
+              <a:r>
+                <a:rPr lang="en-GB" sz="1200" b="1" dirty="0" smtClean="0"/>
+                <a:t>A</a:t>
+              </a:r>
+              <a:endParaRPr lang="en-GB" sz="1200" b="1" dirty="0"/>
+            </a:p>
+          </p:txBody>
+        </p:sp>
+        <p:sp>
+          <p:nvSpPr>
+            <p:cNvPr id="41" name="Rectangle 40"/>
+            <p:cNvSpPr/>
+            <p:nvPr/>
+          </p:nvSpPr>
+          <p:spPr>
+            <a:xfrm>
+              <a:off x="9117657" y="2068164"/>
+              <a:ext cx="403654" cy="403654"/>
+            </a:xfrm>
+            <a:prstGeom prst="rect">
+              <a:avLst/>
+            </a:prstGeom>
             <a:solidFill>
-              <a:srgbClr val="38528C"/>
+              <a:srgbClr val="D1A245"/>
             </a:solidFill>
-            <a:tailEnd type="triangle"/>
-          </a:ln>
-        </p:spPr>
-        <p:style>
-          <a:lnRef idx="1">
-            <a:schemeClr val="accent1"/>
-          </a:lnRef>
-          <a:fillRef idx="0">
-            <a:schemeClr val="accent1"/>
-          </a:fillRef>
-          <a:effectRef idx="0">
-            <a:schemeClr val="accent1"/>
-          </a:effectRef>
-          <a:fontRef idx="minor">
-            <a:schemeClr val="tx1"/>
-          </a:fontRef>
-        </p:style>
-        <p:txBody>
-          <a:bodyPr rtlCol="0" anchor="ctr"/>
-          <a:lstStyle/>
-          <a:p>
-            <a:pPr algn="ctr"/>
-            <a:endParaRPr lang="en-GB"/>
-          </a:p>
-        </p:txBody>
-      </p:sp>
-      <p:sp>
-        <p:nvSpPr>
-          <p:cNvPr id="73" name="Arc 72"/>
-          <p:cNvSpPr/>
-          <p:nvPr/>
-        </p:nvSpPr>
-        <p:spPr>
-          <a:xfrm rot="4386381">
-            <a:off x="2087549" y="2424995"/>
-            <a:ext cx="451817" cy="487063"/>
-          </a:xfrm>
-          <a:prstGeom prst="arc">
-            <a:avLst>
-              <a:gd name="adj1" fmla="val 10278105"/>
-              <a:gd name="adj2" fmla="val 1849105"/>
-            </a:avLst>
-          </a:prstGeom>
-          <a:ln w="38100">
+            <a:ln>
+              <a:noFill/>
+            </a:ln>
+          </p:spPr>
+          <p:style>
+            <a:lnRef idx="2">
+              <a:schemeClr val="accent1">
+                <a:shade val="50000"/>
+              </a:schemeClr>
+            </a:lnRef>
+            <a:fillRef idx="1">
+              <a:schemeClr val="accent1"/>
+            </a:fillRef>
+            <a:effectRef idx="0">
+              <a:schemeClr val="accent1"/>
+            </a:effectRef>
+            <a:fontRef idx="minor">
+              <a:schemeClr val="lt1"/>
+            </a:fontRef>
+          </p:style>
+          <p:txBody>
+            <a:bodyPr rtlCol="0" anchor="ctr"/>
+            <a:lstStyle/>
+            <a:p>
+              <a:pPr algn="ctr"/>
+              <a:r>
+                <a:rPr lang="en-GB" sz="1200" b="1" dirty="0" smtClean="0"/>
+                <a:t>B</a:t>
+              </a:r>
+              <a:endParaRPr lang="en-GB" sz="1200" b="1" dirty="0"/>
+            </a:p>
+          </p:txBody>
+        </p:sp>
+        <p:sp>
+          <p:nvSpPr>
+            <p:cNvPr id="42" name="Rectangle 41"/>
+            <p:cNvSpPr/>
+            <p:nvPr/>
+          </p:nvSpPr>
+          <p:spPr>
+            <a:xfrm>
+              <a:off x="9117657" y="2513806"/>
+              <a:ext cx="403654" cy="403654"/>
+            </a:xfrm>
+            <a:prstGeom prst="rect">
+              <a:avLst/>
+            </a:prstGeom>
             <a:solidFill>
-              <a:srgbClr val="38528C"/>
+              <a:srgbClr val="CC444E"/>
             </a:solidFill>
-            <a:tailEnd type="triangle"/>
-          </a:ln>
-        </p:spPr>
-        <p:style>
-          <a:lnRef idx="1">
-            <a:schemeClr val="accent1"/>
-          </a:lnRef>
-          <a:fillRef idx="0">
-            <a:schemeClr val="accent1"/>
-          </a:fillRef>
-          <a:effectRef idx="0">
-            <a:schemeClr val="accent1"/>
-          </a:effectRef>
-          <a:fontRef idx="minor">
-            <a:schemeClr val="tx1"/>
-          </a:fontRef>
-        </p:style>
-        <p:txBody>
-          <a:bodyPr rtlCol="0" anchor="ctr"/>
-          <a:lstStyle/>
-          <a:p>
-            <a:pPr algn="ctr"/>
-            <a:endParaRPr lang="en-GB"/>
-          </a:p>
-        </p:txBody>
-      </p:sp>
-      <p:sp>
-        <p:nvSpPr>
-          <p:cNvPr id="74" name="Arc 73"/>
-          <p:cNvSpPr/>
-          <p:nvPr/>
-        </p:nvSpPr>
-        <p:spPr>
-          <a:xfrm rot="3524505">
-            <a:off x="2087551" y="884816"/>
-            <a:ext cx="451817" cy="487063"/>
-          </a:xfrm>
-          <a:prstGeom prst="arc">
-            <a:avLst>
-              <a:gd name="adj1" fmla="val 10278105"/>
-              <a:gd name="adj2" fmla="val 1849105"/>
-            </a:avLst>
-          </a:prstGeom>
-          <a:ln w="38100">
+            <a:ln>
+              <a:noFill/>
+            </a:ln>
+          </p:spPr>
+          <p:style>
+            <a:lnRef idx="2">
+              <a:schemeClr val="accent1">
+                <a:shade val="50000"/>
+              </a:schemeClr>
+            </a:lnRef>
+            <a:fillRef idx="1">
+              <a:schemeClr val="accent1"/>
+            </a:fillRef>
+            <a:effectRef idx="0">
+              <a:schemeClr val="accent1"/>
+            </a:effectRef>
+            <a:fontRef idx="minor">
+              <a:schemeClr val="lt1"/>
+            </a:fontRef>
+          </p:style>
+          <p:txBody>
+            <a:bodyPr rtlCol="0" anchor="ctr"/>
+            <a:lstStyle/>
+            <a:p>
+              <a:pPr algn="ctr"/>
+              <a:r>
+                <a:rPr lang="en-GB" sz="1200" b="1" dirty="0" smtClean="0"/>
+                <a:t>C</a:t>
+              </a:r>
+              <a:endParaRPr lang="en-GB" sz="1200" b="1" dirty="0"/>
+            </a:p>
+          </p:txBody>
+        </p:sp>
+        <p:sp>
+          <p:nvSpPr>
+            <p:cNvPr id="44" name="Oval 43"/>
+            <p:cNvSpPr/>
+            <p:nvPr/>
+          </p:nvSpPr>
+          <p:spPr>
+            <a:xfrm>
+              <a:off x="6354719" y="441879"/>
+              <a:ext cx="807308" cy="807308"/>
+            </a:xfrm>
+            <a:prstGeom prst="ellipse">
+              <a:avLst/>
+            </a:prstGeom>
             <a:solidFill>
-              <a:srgbClr val="38528C"/>
+              <a:srgbClr val="99DF8D"/>
             </a:solidFill>
-            <a:tailEnd type="triangle"/>
-          </a:ln>
-        </p:spPr>
-        <p:style>
-          <a:lnRef idx="1">
-            <a:schemeClr val="accent1"/>
-          </a:lnRef>
-          <a:fillRef idx="0">
-            <a:schemeClr val="accent1"/>
-          </a:fillRef>
-          <a:effectRef idx="0">
-            <a:schemeClr val="accent1"/>
-          </a:effectRef>
-          <a:fontRef idx="minor">
-            <a:schemeClr val="tx1"/>
-          </a:fontRef>
-        </p:style>
-        <p:txBody>
-          <a:bodyPr rtlCol="0" anchor="ctr"/>
-          <a:lstStyle/>
-          <a:p>
-            <a:pPr algn="ctr"/>
-            <a:endParaRPr lang="en-GB"/>
-          </a:p>
-        </p:txBody>
-      </p:sp>
-      <p:cxnSp>
-        <p:nvCxnSpPr>
-          <p:cNvPr id="10" name="Straight Arrow Connector 9"/>
-          <p:cNvCxnSpPr/>
-          <p:nvPr/>
-        </p:nvCxnSpPr>
-        <p:spPr>
-          <a:xfrm flipV="1">
-            <a:off x="1624379" y="1533802"/>
-            <a:ext cx="0" cy="874883"/>
-          </a:xfrm>
-          <a:prstGeom prst="straightConnector1">
-            <a:avLst/>
-          </a:prstGeom>
-          <a:ln w="38100">
-            <a:solidFill>
-              <a:srgbClr val="38528C"/>
-            </a:solidFill>
-            <a:tailEnd type="triangle"/>
-          </a:ln>
-        </p:spPr>
-        <p:style>
-          <a:lnRef idx="1">
-            <a:schemeClr val="accent1"/>
-          </a:lnRef>
-          <a:fillRef idx="0">
-            <a:schemeClr val="accent1"/>
-          </a:fillRef>
-          <a:effectRef idx="0">
-            <a:schemeClr val="accent1"/>
-          </a:effectRef>
-          <a:fontRef idx="minor">
-            <a:schemeClr val="tx1"/>
-          </a:fontRef>
-        </p:style>
-      </p:cxnSp>
-      <p:cxnSp>
-        <p:nvCxnSpPr>
-          <p:cNvPr id="12" name="Straight Arrow Connector 11"/>
-          <p:cNvCxnSpPr/>
-          <p:nvPr/>
-        </p:nvCxnSpPr>
-        <p:spPr>
-          <a:xfrm>
-            <a:off x="2195231" y="1394102"/>
-            <a:ext cx="0" cy="874883"/>
-          </a:xfrm>
-          <a:prstGeom prst="straightConnector1">
-            <a:avLst/>
-          </a:prstGeom>
-          <a:ln w="38100">
-            <a:solidFill>
-              <a:srgbClr val="38528C"/>
-            </a:solidFill>
-            <a:tailEnd type="triangle"/>
-          </a:ln>
-        </p:spPr>
-        <p:style>
-          <a:lnRef idx="1">
-            <a:schemeClr val="accent1"/>
-          </a:lnRef>
-          <a:fillRef idx="0">
-            <a:schemeClr val="accent1"/>
-          </a:fillRef>
-          <a:effectRef idx="0">
-            <a:schemeClr val="accent1"/>
-          </a:effectRef>
-          <a:fontRef idx="minor">
-            <a:schemeClr val="tx1"/>
-          </a:fontRef>
-        </p:style>
-      </p:cxnSp>
-      <p:sp>
-        <p:nvSpPr>
-          <p:cNvPr id="7" name="Oval 6"/>
-          <p:cNvSpPr/>
-          <p:nvPr/>
-        </p:nvSpPr>
-        <p:spPr>
-          <a:xfrm>
-            <a:off x="1506151" y="768522"/>
-            <a:ext cx="807308" cy="807308"/>
-          </a:xfrm>
-          <a:prstGeom prst="ellipse">
-            <a:avLst/>
-          </a:prstGeom>
-          <a:solidFill>
-            <a:srgbClr val="99DF8D"/>
-          </a:solidFill>
-          <a:ln w="28575">
+            <a:ln w="28575">
+              <a:solidFill>
+                <a:srgbClr val="187509"/>
+              </a:solidFill>
+            </a:ln>
+          </p:spPr>
+          <p:style>
+            <a:lnRef idx="2">
+              <a:schemeClr val="accent1">
+                <a:shade val="50000"/>
+              </a:schemeClr>
+            </a:lnRef>
+            <a:fillRef idx="1">
+              <a:schemeClr val="accent1"/>
+            </a:fillRef>
+            <a:effectRef idx="0">
+              <a:schemeClr val="accent1"/>
+            </a:effectRef>
+            <a:fontRef idx="minor">
+              <a:schemeClr val="lt1"/>
+            </a:fontRef>
+          </p:style>
+          <p:txBody>
+            <a:bodyPr rtlCol="0" anchor="ctr"/>
+            <a:lstStyle/>
+            <a:p>
+              <a:pPr algn="ctr"/>
+              <a:endParaRPr lang="en-GB" sz="1200"/>
+            </a:p>
+          </p:txBody>
+        </p:sp>
+        <p:sp>
+          <p:nvSpPr>
+            <p:cNvPr id="55" name="Rectangle 54"/>
+            <p:cNvSpPr/>
+            <p:nvPr/>
+          </p:nvSpPr>
+          <p:spPr>
+            <a:xfrm>
+              <a:off x="9117657" y="2959449"/>
+              <a:ext cx="403654" cy="403654"/>
+            </a:xfrm>
+            <a:prstGeom prst="rect">
+              <a:avLst/>
+            </a:prstGeom>
             <a:solidFill>
               <a:srgbClr val="187509"/>
             </a:solidFill>
-          </a:ln>
-        </p:spPr>
-        <p:style>
-          <a:lnRef idx="2">
-            <a:schemeClr val="accent1">
-              <a:shade val="50000"/>
-            </a:schemeClr>
-          </a:lnRef>
-          <a:fillRef idx="1">
-            <a:schemeClr val="accent1"/>
-          </a:fillRef>
-          <a:effectRef idx="0">
-            <a:schemeClr val="accent1"/>
-          </a:effectRef>
-          <a:fontRef idx="minor">
-            <a:schemeClr val="lt1"/>
-          </a:fontRef>
-        </p:style>
-        <p:txBody>
-          <a:bodyPr rtlCol="0" anchor="ctr"/>
-          <a:lstStyle/>
-          <a:p>
-            <a:pPr algn="ctr"/>
-            <a:endParaRPr lang="en-GB"/>
-          </a:p>
-        </p:txBody>
-      </p:sp>
-      <p:sp>
-        <p:nvSpPr>
-          <p:cNvPr id="9" name="Oval 8"/>
-          <p:cNvSpPr/>
-          <p:nvPr/>
-        </p:nvSpPr>
-        <p:spPr>
-          <a:xfrm>
-            <a:off x="1506151" y="2214257"/>
-            <a:ext cx="807308" cy="807308"/>
-          </a:xfrm>
-          <a:prstGeom prst="ellipse">
-            <a:avLst/>
-          </a:prstGeom>
-          <a:solidFill>
-            <a:srgbClr val="99DF8D"/>
-          </a:solidFill>
-          <a:ln w="28575">
-            <a:solidFill>
-              <a:srgbClr val="187509"/>
-            </a:solidFill>
-          </a:ln>
-        </p:spPr>
-        <p:style>
-          <a:lnRef idx="2">
-            <a:schemeClr val="accent1">
-              <a:shade val="50000"/>
-            </a:schemeClr>
-          </a:lnRef>
-          <a:fillRef idx="1">
-            <a:schemeClr val="accent1"/>
-          </a:fillRef>
-          <a:effectRef idx="0">
-            <a:schemeClr val="accent1"/>
-          </a:effectRef>
-          <a:fontRef idx="minor">
-            <a:schemeClr val="lt1"/>
-          </a:fontRef>
-        </p:style>
-        <p:txBody>
-          <a:bodyPr rtlCol="0" anchor="ctr"/>
-          <a:lstStyle/>
-          <a:p>
-            <a:pPr algn="ctr"/>
-            <a:endParaRPr lang="en-GB"/>
-          </a:p>
-        </p:txBody>
-      </p:sp>
-      <p:cxnSp>
-        <p:nvCxnSpPr>
-          <p:cNvPr id="17" name="Straight Arrow Connector 16"/>
-          <p:cNvCxnSpPr>
-            <a:endCxn id="9" idx="4"/>
-          </p:cNvCxnSpPr>
-          <p:nvPr/>
-        </p:nvCxnSpPr>
-        <p:spPr>
-          <a:xfrm flipV="1">
-            <a:off x="1909805" y="3021565"/>
-            <a:ext cx="0" cy="399541"/>
-          </a:xfrm>
-          <a:prstGeom prst="straightConnector1">
-            <a:avLst/>
-          </a:prstGeom>
-          <a:ln w="38100">
-            <a:solidFill>
-              <a:srgbClr val="CC444E"/>
-            </a:solidFill>
-            <a:tailEnd type="triangle"/>
-          </a:ln>
-        </p:spPr>
-        <p:style>
-          <a:lnRef idx="1">
-            <a:schemeClr val="accent1"/>
-          </a:lnRef>
-          <a:fillRef idx="0">
-            <a:schemeClr val="accent1"/>
-          </a:fillRef>
-          <a:effectRef idx="0">
-            <a:schemeClr val="accent1"/>
-          </a:effectRef>
-          <a:fontRef idx="minor">
-            <a:schemeClr val="tx1"/>
-          </a:fontRef>
-        </p:style>
-      </p:cxnSp>
-      <p:cxnSp>
-        <p:nvCxnSpPr>
-          <p:cNvPr id="23" name="Straight Connector 22"/>
-          <p:cNvCxnSpPr/>
-          <p:nvPr/>
-        </p:nvCxnSpPr>
-        <p:spPr>
-          <a:xfrm>
-            <a:off x="674130" y="1963008"/>
-            <a:ext cx="950249" cy="0"/>
-          </a:xfrm>
-          <a:prstGeom prst="line">
-            <a:avLst/>
-          </a:prstGeom>
-          <a:ln w="38100">
-            <a:solidFill>
-              <a:srgbClr val="D1A245"/>
-            </a:solidFill>
-            <a:tailEnd type="oval"/>
-          </a:ln>
-        </p:spPr>
-        <p:style>
-          <a:lnRef idx="1">
-            <a:schemeClr val="accent1"/>
-          </a:lnRef>
-          <a:fillRef idx="0">
-            <a:schemeClr val="accent1"/>
-          </a:fillRef>
-          <a:effectRef idx="0">
-            <a:schemeClr val="accent1"/>
-          </a:effectRef>
-          <a:fontRef idx="minor">
-            <a:schemeClr val="tx1"/>
-          </a:fontRef>
-        </p:style>
-      </p:cxnSp>
-      <p:sp>
-        <p:nvSpPr>
-          <p:cNvPr id="28" name="Rectangle 27"/>
-          <p:cNvSpPr/>
-          <p:nvPr/>
-        </p:nvSpPr>
-        <p:spPr>
-          <a:xfrm>
-            <a:off x="2766026" y="1222981"/>
-            <a:ext cx="403654" cy="403654"/>
-          </a:xfrm>
-          <a:prstGeom prst="rect">
-            <a:avLst/>
-          </a:prstGeom>
-          <a:solidFill>
-            <a:srgbClr val="38528C"/>
-          </a:solidFill>
-          <a:ln>
-            <a:noFill/>
-          </a:ln>
-        </p:spPr>
-        <p:style>
-          <a:lnRef idx="2">
-            <a:schemeClr val="accent1">
-              <a:shade val="50000"/>
-            </a:schemeClr>
-          </a:lnRef>
-          <a:fillRef idx="1">
-            <a:schemeClr val="accent1"/>
-          </a:fillRef>
-          <a:effectRef idx="0">
-            <a:schemeClr val="accent1"/>
-          </a:effectRef>
-          <a:fontRef idx="minor">
-            <a:schemeClr val="lt1"/>
-          </a:fontRef>
-        </p:style>
-        <p:txBody>
-          <a:bodyPr rtlCol="0" anchor="ctr"/>
-          <a:lstStyle/>
-          <a:p>
-            <a:pPr algn="ctr"/>
-            <a:r>
-              <a:rPr lang="en-GB" b="1" dirty="0" smtClean="0"/>
-              <a:t>A</a:t>
-            </a:r>
-            <a:endParaRPr lang="en-GB" b="1" dirty="0"/>
-          </a:p>
-        </p:txBody>
-      </p:sp>
-      <p:sp>
-        <p:nvSpPr>
-          <p:cNvPr id="30" name="Rectangle 29"/>
-          <p:cNvSpPr/>
-          <p:nvPr/>
-        </p:nvSpPr>
-        <p:spPr>
-          <a:xfrm>
-            <a:off x="2766026" y="1672281"/>
-            <a:ext cx="403654" cy="403654"/>
-          </a:xfrm>
-          <a:prstGeom prst="rect">
-            <a:avLst/>
-          </a:prstGeom>
-          <a:solidFill>
-            <a:srgbClr val="D1A245"/>
-          </a:solidFill>
-          <a:ln>
-            <a:noFill/>
-          </a:ln>
-        </p:spPr>
-        <p:style>
-          <a:lnRef idx="2">
-            <a:schemeClr val="accent1">
-              <a:shade val="50000"/>
-            </a:schemeClr>
-          </a:lnRef>
-          <a:fillRef idx="1">
-            <a:schemeClr val="accent1"/>
-          </a:fillRef>
-          <a:effectRef idx="0">
-            <a:schemeClr val="accent1"/>
-          </a:effectRef>
-          <a:fontRef idx="minor">
-            <a:schemeClr val="lt1"/>
-          </a:fontRef>
-        </p:style>
-        <p:txBody>
-          <a:bodyPr rtlCol="0" anchor="ctr"/>
-          <a:lstStyle/>
-          <a:p>
-            <a:pPr algn="ctr"/>
-            <a:r>
-              <a:rPr lang="en-GB" b="1" dirty="0" smtClean="0"/>
-              <a:t>B</a:t>
-            </a:r>
-            <a:endParaRPr lang="en-GB" b="1" dirty="0"/>
-          </a:p>
-        </p:txBody>
-      </p:sp>
-      <p:sp>
-        <p:nvSpPr>
-          <p:cNvPr id="31" name="Rectangle 30"/>
-          <p:cNvSpPr/>
-          <p:nvPr/>
-        </p:nvSpPr>
-        <p:spPr>
-          <a:xfrm>
-            <a:off x="2766026" y="2116781"/>
-            <a:ext cx="403654" cy="403654"/>
-          </a:xfrm>
-          <a:prstGeom prst="rect">
-            <a:avLst/>
-          </a:prstGeom>
-          <a:solidFill>
-            <a:srgbClr val="CC444E"/>
-          </a:solidFill>
-          <a:ln>
-            <a:noFill/>
-          </a:ln>
-        </p:spPr>
-        <p:style>
-          <a:lnRef idx="2">
-            <a:schemeClr val="accent1">
-              <a:shade val="50000"/>
-            </a:schemeClr>
-          </a:lnRef>
-          <a:fillRef idx="1">
-            <a:schemeClr val="accent1"/>
-          </a:fillRef>
-          <a:effectRef idx="0">
-            <a:schemeClr val="accent1"/>
-          </a:effectRef>
-          <a:fontRef idx="minor">
-            <a:schemeClr val="lt1"/>
-          </a:fontRef>
-        </p:style>
-        <p:txBody>
-          <a:bodyPr rtlCol="0" anchor="ctr"/>
-          <a:lstStyle/>
-          <a:p>
-            <a:pPr algn="ctr"/>
-            <a:r>
-              <a:rPr lang="en-GB" b="1" dirty="0" smtClean="0"/>
-              <a:t>C</a:t>
-            </a:r>
-            <a:endParaRPr lang="en-GB" b="1" dirty="0"/>
-          </a:p>
-        </p:txBody>
-      </p:sp>
-      <p:cxnSp>
-        <p:nvCxnSpPr>
-          <p:cNvPr id="34" name="Straight Arrow Connector 33"/>
-          <p:cNvCxnSpPr/>
-          <p:nvPr/>
-        </p:nvCxnSpPr>
-        <p:spPr>
-          <a:xfrm flipV="1">
-            <a:off x="7976010" y="1907943"/>
-            <a:ext cx="0" cy="874883"/>
-          </a:xfrm>
-          <a:prstGeom prst="straightConnector1">
-            <a:avLst/>
-          </a:prstGeom>
-          <a:ln w="38100">
-            <a:solidFill>
-              <a:srgbClr val="38528C"/>
-            </a:solidFill>
-            <a:tailEnd type="triangle"/>
-          </a:ln>
-        </p:spPr>
-        <p:style>
-          <a:lnRef idx="1">
-            <a:schemeClr val="accent1"/>
-          </a:lnRef>
-          <a:fillRef idx="0">
-            <a:schemeClr val="accent1"/>
-          </a:fillRef>
-          <a:effectRef idx="0">
-            <a:schemeClr val="accent1"/>
-          </a:effectRef>
-          <a:fontRef idx="minor">
-            <a:schemeClr val="tx1"/>
-          </a:fontRef>
-        </p:style>
-      </p:cxnSp>
-      <p:cxnSp>
-        <p:nvCxnSpPr>
-          <p:cNvPr id="35" name="Straight Arrow Connector 34"/>
-          <p:cNvCxnSpPr/>
-          <p:nvPr/>
-        </p:nvCxnSpPr>
-        <p:spPr>
-          <a:xfrm>
-            <a:off x="8546862" y="1793643"/>
-            <a:ext cx="0" cy="874883"/>
-          </a:xfrm>
-          <a:prstGeom prst="straightConnector1">
-            <a:avLst/>
-          </a:prstGeom>
-          <a:ln w="38100">
-            <a:solidFill>
-              <a:srgbClr val="38528C"/>
-            </a:solidFill>
-            <a:tailEnd type="triangle"/>
-          </a:ln>
-        </p:spPr>
-        <p:style>
-          <a:lnRef idx="1">
-            <a:schemeClr val="accent1"/>
-          </a:lnRef>
-          <a:fillRef idx="0">
-            <a:schemeClr val="accent1"/>
-          </a:fillRef>
-          <a:effectRef idx="0">
-            <a:schemeClr val="accent1"/>
-          </a:effectRef>
-          <a:fontRef idx="minor">
-            <a:schemeClr val="tx1"/>
-          </a:fontRef>
-        </p:style>
-      </p:cxnSp>
-      <p:sp>
-        <p:nvSpPr>
-          <p:cNvPr id="36" name="Oval 35"/>
-          <p:cNvSpPr/>
-          <p:nvPr/>
-        </p:nvSpPr>
-        <p:spPr>
-          <a:xfrm>
-            <a:off x="7857782" y="1168063"/>
-            <a:ext cx="807308" cy="807308"/>
-          </a:xfrm>
-          <a:prstGeom prst="ellipse">
-            <a:avLst/>
-          </a:prstGeom>
-          <a:solidFill>
-            <a:srgbClr val="99DF8D"/>
-          </a:solidFill>
-          <a:ln w="28575">
-            <a:solidFill>
-              <a:srgbClr val="187509"/>
-            </a:solidFill>
-          </a:ln>
-        </p:spPr>
-        <p:style>
-          <a:lnRef idx="2">
-            <a:schemeClr val="accent1">
-              <a:shade val="50000"/>
-            </a:schemeClr>
-          </a:lnRef>
-          <a:fillRef idx="1">
-            <a:schemeClr val="accent1"/>
-          </a:fillRef>
-          <a:effectRef idx="0">
-            <a:schemeClr val="accent1"/>
-          </a:effectRef>
-          <a:fontRef idx="minor">
-            <a:schemeClr val="lt1"/>
-          </a:fontRef>
-        </p:style>
-        <p:txBody>
-          <a:bodyPr rtlCol="0" anchor="ctr"/>
-          <a:lstStyle/>
-          <a:p>
-            <a:pPr algn="ctr"/>
-            <a:endParaRPr lang="en-GB"/>
-          </a:p>
-        </p:txBody>
-      </p:sp>
-      <p:sp>
-        <p:nvSpPr>
-          <p:cNvPr id="37" name="Oval 36"/>
-          <p:cNvSpPr/>
-          <p:nvPr/>
-        </p:nvSpPr>
-        <p:spPr>
-          <a:xfrm>
-            <a:off x="7857782" y="2613798"/>
-            <a:ext cx="807308" cy="807308"/>
-          </a:xfrm>
-          <a:prstGeom prst="ellipse">
-            <a:avLst/>
-          </a:prstGeom>
-          <a:solidFill>
-            <a:srgbClr val="99DF8D"/>
-          </a:solidFill>
-          <a:ln w="28575">
-            <a:solidFill>
-              <a:srgbClr val="187509"/>
-            </a:solidFill>
-          </a:ln>
-        </p:spPr>
-        <p:style>
-          <a:lnRef idx="2">
-            <a:schemeClr val="accent1">
-              <a:shade val="50000"/>
-            </a:schemeClr>
-          </a:lnRef>
-          <a:fillRef idx="1">
-            <a:schemeClr val="accent1"/>
-          </a:fillRef>
-          <a:effectRef idx="0">
-            <a:schemeClr val="accent1"/>
-          </a:effectRef>
-          <a:fontRef idx="minor">
-            <a:schemeClr val="lt1"/>
-          </a:fontRef>
-        </p:style>
-        <p:txBody>
-          <a:bodyPr rtlCol="0" anchor="ctr"/>
-          <a:lstStyle/>
-          <a:p>
-            <a:pPr algn="ctr"/>
-            <a:endParaRPr lang="en-GB"/>
-          </a:p>
-        </p:txBody>
-      </p:sp>
-      <p:cxnSp>
-        <p:nvCxnSpPr>
-          <p:cNvPr id="39" name="Straight Connector 38"/>
-          <p:cNvCxnSpPr/>
-          <p:nvPr/>
-        </p:nvCxnSpPr>
-        <p:spPr>
-          <a:xfrm>
-            <a:off x="7025761" y="2536460"/>
-            <a:ext cx="950249" cy="0"/>
-          </a:xfrm>
-          <a:prstGeom prst="line">
-            <a:avLst/>
-          </a:prstGeom>
-          <a:ln w="38100">
-            <a:solidFill>
-              <a:srgbClr val="D1A245"/>
-            </a:solidFill>
-            <a:tailEnd type="oval"/>
-          </a:ln>
-        </p:spPr>
-        <p:style>
-          <a:lnRef idx="1">
-            <a:schemeClr val="accent1"/>
-          </a:lnRef>
-          <a:fillRef idx="0">
-            <a:schemeClr val="accent1"/>
-          </a:fillRef>
-          <a:effectRef idx="0">
-            <a:schemeClr val="accent1"/>
-          </a:effectRef>
-          <a:fontRef idx="minor">
-            <a:schemeClr val="tx1"/>
-          </a:fontRef>
-        </p:style>
-      </p:cxnSp>
-      <p:sp>
-        <p:nvSpPr>
-          <p:cNvPr id="40" name="Rectangle 39"/>
-          <p:cNvSpPr/>
-          <p:nvPr/>
-        </p:nvSpPr>
-        <p:spPr>
-          <a:xfrm>
-            <a:off x="9117657" y="1622522"/>
-            <a:ext cx="403654" cy="403654"/>
-          </a:xfrm>
-          <a:prstGeom prst="rect">
-            <a:avLst/>
-          </a:prstGeom>
-          <a:solidFill>
-            <a:srgbClr val="38528C"/>
-          </a:solidFill>
-          <a:ln>
-            <a:noFill/>
-          </a:ln>
-        </p:spPr>
-        <p:style>
-          <a:lnRef idx="2">
-            <a:schemeClr val="accent1">
-              <a:shade val="50000"/>
-            </a:schemeClr>
-          </a:lnRef>
-          <a:fillRef idx="1">
-            <a:schemeClr val="accent1"/>
-          </a:fillRef>
-          <a:effectRef idx="0">
-            <a:schemeClr val="accent1"/>
-          </a:effectRef>
-          <a:fontRef idx="minor">
-            <a:schemeClr val="lt1"/>
-          </a:fontRef>
-        </p:style>
-        <p:txBody>
-          <a:bodyPr rtlCol="0" anchor="ctr"/>
-          <a:lstStyle/>
-          <a:p>
-            <a:pPr algn="ctr"/>
-            <a:r>
-              <a:rPr lang="en-GB" b="1" dirty="0" smtClean="0"/>
-              <a:t>A</a:t>
-            </a:r>
-            <a:endParaRPr lang="en-GB" b="1" dirty="0"/>
-          </a:p>
-        </p:txBody>
-      </p:sp>
-      <p:sp>
-        <p:nvSpPr>
-          <p:cNvPr id="41" name="Rectangle 40"/>
-          <p:cNvSpPr/>
-          <p:nvPr/>
-        </p:nvSpPr>
-        <p:spPr>
-          <a:xfrm>
-            <a:off x="9117657" y="2068164"/>
-            <a:ext cx="403654" cy="403654"/>
-          </a:xfrm>
-          <a:prstGeom prst="rect">
-            <a:avLst/>
-          </a:prstGeom>
-          <a:solidFill>
-            <a:srgbClr val="D1A245"/>
-          </a:solidFill>
-          <a:ln>
-            <a:noFill/>
-          </a:ln>
-        </p:spPr>
-        <p:style>
-          <a:lnRef idx="2">
-            <a:schemeClr val="accent1">
-              <a:shade val="50000"/>
-            </a:schemeClr>
-          </a:lnRef>
-          <a:fillRef idx="1">
-            <a:schemeClr val="accent1"/>
-          </a:fillRef>
-          <a:effectRef idx="0">
-            <a:schemeClr val="accent1"/>
-          </a:effectRef>
-          <a:fontRef idx="minor">
-            <a:schemeClr val="lt1"/>
-          </a:fontRef>
-        </p:style>
-        <p:txBody>
-          <a:bodyPr rtlCol="0" anchor="ctr"/>
-          <a:lstStyle/>
-          <a:p>
-            <a:pPr algn="ctr"/>
-            <a:r>
-              <a:rPr lang="en-GB" b="1" dirty="0" smtClean="0"/>
-              <a:t>B</a:t>
-            </a:r>
-            <a:endParaRPr lang="en-GB" b="1" dirty="0"/>
-          </a:p>
-        </p:txBody>
-      </p:sp>
-      <p:sp>
-        <p:nvSpPr>
-          <p:cNvPr id="42" name="Rectangle 41"/>
-          <p:cNvSpPr/>
-          <p:nvPr/>
-        </p:nvSpPr>
-        <p:spPr>
-          <a:xfrm>
-            <a:off x="9117657" y="2513806"/>
-            <a:ext cx="403654" cy="403654"/>
-          </a:xfrm>
-          <a:prstGeom prst="rect">
-            <a:avLst/>
-          </a:prstGeom>
-          <a:solidFill>
-            <a:srgbClr val="CC444E"/>
-          </a:solidFill>
-          <a:ln>
-            <a:noFill/>
-          </a:ln>
-        </p:spPr>
-        <p:style>
-          <a:lnRef idx="2">
-            <a:schemeClr val="accent1">
-              <a:shade val="50000"/>
-            </a:schemeClr>
-          </a:lnRef>
-          <a:fillRef idx="1">
-            <a:schemeClr val="accent1"/>
-          </a:fillRef>
-          <a:effectRef idx="0">
-            <a:schemeClr val="accent1"/>
-          </a:effectRef>
-          <a:fontRef idx="minor">
-            <a:schemeClr val="lt1"/>
-          </a:fontRef>
-        </p:style>
-        <p:txBody>
-          <a:bodyPr rtlCol="0" anchor="ctr"/>
-          <a:lstStyle/>
-          <a:p>
-            <a:pPr algn="ctr"/>
-            <a:r>
-              <a:rPr lang="en-GB" b="1" dirty="0" smtClean="0"/>
-              <a:t>C</a:t>
-            </a:r>
-            <a:endParaRPr lang="en-GB" b="1" dirty="0"/>
-          </a:p>
-        </p:txBody>
-      </p:sp>
-      <p:sp>
-        <p:nvSpPr>
-          <p:cNvPr id="44" name="Oval 43"/>
-          <p:cNvSpPr/>
-          <p:nvPr/>
-        </p:nvSpPr>
-        <p:spPr>
-          <a:xfrm>
-            <a:off x="6354719" y="441879"/>
-            <a:ext cx="807308" cy="807308"/>
-          </a:xfrm>
-          <a:prstGeom prst="ellipse">
-            <a:avLst/>
-          </a:prstGeom>
-          <a:solidFill>
-            <a:srgbClr val="99DF8D"/>
-          </a:solidFill>
-          <a:ln w="28575">
-            <a:solidFill>
-              <a:srgbClr val="187509"/>
-            </a:solidFill>
-          </a:ln>
-        </p:spPr>
-        <p:style>
-          <a:lnRef idx="2">
-            <a:schemeClr val="accent1">
-              <a:shade val="50000"/>
-            </a:schemeClr>
-          </a:lnRef>
-          <a:fillRef idx="1">
-            <a:schemeClr val="accent1"/>
-          </a:fillRef>
-          <a:effectRef idx="0">
-            <a:schemeClr val="accent1"/>
-          </a:effectRef>
-          <a:fontRef idx="minor">
-            <a:schemeClr val="lt1"/>
-          </a:fontRef>
-        </p:style>
-        <p:txBody>
-          <a:bodyPr rtlCol="0" anchor="ctr"/>
-          <a:lstStyle/>
-          <a:p>
-            <a:pPr algn="ctr"/>
-            <a:endParaRPr lang="en-GB"/>
-          </a:p>
-        </p:txBody>
-      </p:sp>
-      <p:sp>
-        <p:nvSpPr>
-          <p:cNvPr id="55" name="Rectangle 54"/>
-          <p:cNvSpPr/>
-          <p:nvPr/>
-        </p:nvSpPr>
-        <p:spPr>
-          <a:xfrm>
-            <a:off x="9117657" y="2959449"/>
-            <a:ext cx="403654" cy="403654"/>
-          </a:xfrm>
-          <a:prstGeom prst="rect">
-            <a:avLst/>
-          </a:prstGeom>
-          <a:solidFill>
-            <a:srgbClr val="187509"/>
-          </a:solidFill>
-          <a:ln>
-            <a:noFill/>
-          </a:ln>
-        </p:spPr>
-        <p:style>
-          <a:lnRef idx="2">
-            <a:schemeClr val="accent1">
-              <a:shade val="50000"/>
-            </a:schemeClr>
-          </a:lnRef>
-          <a:fillRef idx="1">
-            <a:schemeClr val="accent1"/>
-          </a:fillRef>
-          <a:effectRef idx="0">
-            <a:schemeClr val="accent1"/>
-          </a:effectRef>
-          <a:fontRef idx="minor">
-            <a:schemeClr val="lt1"/>
-          </a:fontRef>
-        </p:style>
-        <p:txBody>
-          <a:bodyPr rtlCol="0" anchor="ctr"/>
-          <a:lstStyle/>
-          <a:p>
-            <a:pPr algn="ctr"/>
-            <a:r>
-              <a:rPr lang="en-GB" b="1" dirty="0" smtClean="0"/>
-              <a:t>D</a:t>
-            </a:r>
-            <a:endParaRPr lang="en-GB" b="1" dirty="0"/>
-          </a:p>
-        </p:txBody>
-      </p:sp>
-      <p:cxnSp>
-        <p:nvCxnSpPr>
-          <p:cNvPr id="56" name="Straight Arrow Connector 55"/>
-          <p:cNvCxnSpPr/>
-          <p:nvPr/>
-        </p:nvCxnSpPr>
-        <p:spPr>
-          <a:xfrm flipV="1">
-            <a:off x="8240841" y="3425219"/>
-            <a:ext cx="0" cy="399541"/>
-          </a:xfrm>
-          <a:prstGeom prst="straightConnector1">
-            <a:avLst/>
-          </a:prstGeom>
-          <a:ln w="38100">
-            <a:solidFill>
-              <a:srgbClr val="CC444E"/>
-            </a:solidFill>
-            <a:tailEnd type="triangle"/>
-          </a:ln>
-        </p:spPr>
-        <p:style>
-          <a:lnRef idx="1">
-            <a:schemeClr val="accent1"/>
-          </a:lnRef>
-          <a:fillRef idx="0">
-            <a:schemeClr val="accent1"/>
-          </a:fillRef>
-          <a:effectRef idx="0">
-            <a:schemeClr val="accent1"/>
-          </a:effectRef>
-          <a:fontRef idx="minor">
-            <a:schemeClr val="tx1"/>
-          </a:fontRef>
-        </p:style>
-      </p:cxnSp>
-      <p:cxnSp>
-        <p:nvCxnSpPr>
-          <p:cNvPr id="57" name="Straight Arrow Connector 56"/>
-          <p:cNvCxnSpPr>
-            <a:stCxn id="44" idx="5"/>
-          </p:cNvCxnSpPr>
-          <p:nvPr/>
-        </p:nvCxnSpPr>
-        <p:spPr>
-          <a:xfrm>
-            <a:off x="7043799" y="1130959"/>
-            <a:ext cx="932211" cy="1044026"/>
-          </a:xfrm>
-          <a:prstGeom prst="straightConnector1">
-            <a:avLst/>
-          </a:prstGeom>
-          <a:ln w="38100">
-            <a:solidFill>
-              <a:srgbClr val="187509"/>
-            </a:solidFill>
-            <a:tailEnd type="oval"/>
-          </a:ln>
-        </p:spPr>
-        <p:style>
-          <a:lnRef idx="1">
-            <a:schemeClr val="accent1"/>
-          </a:lnRef>
-          <a:fillRef idx="0">
-            <a:schemeClr val="accent1"/>
-          </a:fillRef>
-          <a:effectRef idx="0">
-            <a:schemeClr val="accent1"/>
-          </a:effectRef>
-          <a:fontRef idx="minor">
-            <a:schemeClr val="tx1"/>
-          </a:fontRef>
-        </p:style>
-      </p:cxnSp>
-      <p:cxnSp>
-        <p:nvCxnSpPr>
-          <p:cNvPr id="60" name="Straight Arrow Connector 59"/>
-          <p:cNvCxnSpPr/>
-          <p:nvPr/>
-        </p:nvCxnSpPr>
-        <p:spPr>
-          <a:xfrm rot="5400000" flipV="1">
-            <a:off x="6103299" y="640421"/>
-            <a:ext cx="0" cy="399541"/>
-          </a:xfrm>
-          <a:prstGeom prst="straightConnector1">
-            <a:avLst/>
-          </a:prstGeom>
-          <a:ln w="38100">
-            <a:solidFill>
-              <a:srgbClr val="CC444E"/>
-            </a:solidFill>
-            <a:tailEnd type="triangle"/>
-          </a:ln>
-        </p:spPr>
-        <p:style>
-          <a:lnRef idx="1">
-            <a:schemeClr val="accent1"/>
-          </a:lnRef>
-          <a:fillRef idx="0">
-            <a:schemeClr val="accent1"/>
-          </a:fillRef>
-          <a:effectRef idx="0">
-            <a:schemeClr val="accent1"/>
-          </a:effectRef>
-          <a:fontRef idx="minor">
-            <a:schemeClr val="tx1"/>
-          </a:fontRef>
-        </p:style>
-      </p:cxnSp>
-      <p:sp>
-        <p:nvSpPr>
-          <p:cNvPr id="77" name="Arc 76"/>
-          <p:cNvSpPr/>
-          <p:nvPr/>
-        </p:nvSpPr>
-        <p:spPr>
-          <a:xfrm rot="3524505">
-            <a:off x="6945217" y="490608"/>
-            <a:ext cx="451817" cy="487063"/>
-          </a:xfrm>
-          <a:prstGeom prst="arc">
-            <a:avLst>
-              <a:gd name="adj1" fmla="val 10278105"/>
-              <a:gd name="adj2" fmla="val 1849105"/>
-            </a:avLst>
-          </a:prstGeom>
-          <a:ln w="38100">
-            <a:solidFill>
-              <a:srgbClr val="38528C"/>
-            </a:solidFill>
-            <a:tailEnd type="triangle"/>
-          </a:ln>
-        </p:spPr>
-        <p:style>
-          <a:lnRef idx="1">
-            <a:schemeClr val="accent1"/>
-          </a:lnRef>
-          <a:fillRef idx="0">
-            <a:schemeClr val="accent1"/>
-          </a:fillRef>
-          <a:effectRef idx="0">
-            <a:schemeClr val="accent1"/>
-          </a:effectRef>
-          <a:fontRef idx="minor">
-            <a:schemeClr val="tx1"/>
-          </a:fontRef>
-        </p:style>
-        <p:txBody>
-          <a:bodyPr rtlCol="0" anchor="ctr"/>
-          <a:lstStyle/>
-          <a:p>
-            <a:pPr algn="ctr"/>
-            <a:endParaRPr lang="en-GB"/>
-          </a:p>
-        </p:txBody>
-      </p:sp>
+            <a:ln>
+              <a:noFill/>
+            </a:ln>
+          </p:spPr>
+          <p:style>
+            <a:lnRef idx="2">
+              <a:schemeClr val="accent1">
+                <a:shade val="50000"/>
+              </a:schemeClr>
+            </a:lnRef>
+            <a:fillRef idx="1">
+              <a:schemeClr val="accent1"/>
+            </a:fillRef>
+            <a:effectRef idx="0">
+              <a:schemeClr val="accent1"/>
+            </a:effectRef>
+            <a:fontRef idx="minor">
+              <a:schemeClr val="lt1"/>
+            </a:fontRef>
+          </p:style>
+          <p:txBody>
+            <a:bodyPr rtlCol="0" anchor="ctr"/>
+            <a:lstStyle/>
+            <a:p>
+              <a:pPr algn="ctr"/>
+              <a:r>
+                <a:rPr lang="en-GB" sz="1200" b="1" dirty="0" smtClean="0"/>
+                <a:t>D</a:t>
+              </a:r>
+              <a:endParaRPr lang="en-GB" sz="1200" b="1" dirty="0"/>
+            </a:p>
+          </p:txBody>
+        </p:sp>
+        <p:cxnSp>
+          <p:nvCxnSpPr>
+            <p:cNvPr id="56" name="Straight Arrow Connector 55"/>
+            <p:cNvCxnSpPr/>
+            <p:nvPr/>
+          </p:nvCxnSpPr>
+          <p:spPr>
+            <a:xfrm flipV="1">
+              <a:off x="8240841" y="3425219"/>
+              <a:ext cx="0" cy="399541"/>
+            </a:xfrm>
+            <a:prstGeom prst="straightConnector1">
+              <a:avLst/>
+            </a:prstGeom>
+            <a:ln w="38100">
+              <a:solidFill>
+                <a:srgbClr val="CC444E"/>
+              </a:solidFill>
+              <a:tailEnd type="triangle"/>
+            </a:ln>
+          </p:spPr>
+          <p:style>
+            <a:lnRef idx="1">
+              <a:schemeClr val="accent1"/>
+            </a:lnRef>
+            <a:fillRef idx="0">
+              <a:schemeClr val="accent1"/>
+            </a:fillRef>
+            <a:effectRef idx="0">
+              <a:schemeClr val="accent1"/>
+            </a:effectRef>
+            <a:fontRef idx="minor">
+              <a:schemeClr val="tx1"/>
+            </a:fontRef>
+          </p:style>
+        </p:cxnSp>
+        <p:cxnSp>
+          <p:nvCxnSpPr>
+            <p:cNvPr id="57" name="Straight Arrow Connector 56"/>
+            <p:cNvCxnSpPr>
+              <a:stCxn id="44" idx="5"/>
+            </p:cNvCxnSpPr>
+            <p:nvPr/>
+          </p:nvCxnSpPr>
+          <p:spPr>
+            <a:xfrm>
+              <a:off x="7043800" y="1130960"/>
+              <a:ext cx="932210" cy="1209935"/>
+            </a:xfrm>
+            <a:prstGeom prst="straightConnector1">
+              <a:avLst/>
+            </a:prstGeom>
+            <a:ln w="38100">
+              <a:solidFill>
+                <a:srgbClr val="187509"/>
+              </a:solidFill>
+              <a:tailEnd type="oval"/>
+            </a:ln>
+          </p:spPr>
+          <p:style>
+            <a:lnRef idx="1">
+              <a:schemeClr val="accent1"/>
+            </a:lnRef>
+            <a:fillRef idx="0">
+              <a:schemeClr val="accent1"/>
+            </a:fillRef>
+            <a:effectRef idx="0">
+              <a:schemeClr val="accent1"/>
+            </a:effectRef>
+            <a:fontRef idx="minor">
+              <a:schemeClr val="tx1"/>
+            </a:fontRef>
+          </p:style>
+        </p:cxnSp>
+        <p:cxnSp>
+          <p:nvCxnSpPr>
+            <p:cNvPr id="60" name="Straight Arrow Connector 59"/>
+            <p:cNvCxnSpPr/>
+            <p:nvPr/>
+          </p:nvCxnSpPr>
+          <p:spPr>
+            <a:xfrm rot="5400000" flipV="1">
+              <a:off x="6103299" y="640421"/>
+              <a:ext cx="0" cy="399541"/>
+            </a:xfrm>
+            <a:prstGeom prst="straightConnector1">
+              <a:avLst/>
+            </a:prstGeom>
+            <a:ln w="38100">
+              <a:solidFill>
+                <a:srgbClr val="CC444E"/>
+              </a:solidFill>
+              <a:tailEnd type="triangle"/>
+            </a:ln>
+          </p:spPr>
+          <p:style>
+            <a:lnRef idx="1">
+              <a:schemeClr val="accent1"/>
+            </a:lnRef>
+            <a:fillRef idx="0">
+              <a:schemeClr val="accent1"/>
+            </a:fillRef>
+            <a:effectRef idx="0">
+              <a:schemeClr val="accent1"/>
+            </a:effectRef>
+            <a:fontRef idx="minor">
+              <a:schemeClr val="tx1"/>
+            </a:fontRef>
+          </p:style>
+        </p:cxnSp>
+        <p:sp>
+          <p:nvSpPr>
+            <p:cNvPr id="77" name="Arc 76"/>
+            <p:cNvSpPr/>
+            <p:nvPr/>
+          </p:nvSpPr>
+          <p:spPr>
+            <a:xfrm rot="3524505">
+              <a:off x="6945217" y="490608"/>
+              <a:ext cx="451817" cy="487063"/>
+            </a:xfrm>
+            <a:prstGeom prst="arc">
+              <a:avLst>
+                <a:gd name="adj1" fmla="val 10278105"/>
+                <a:gd name="adj2" fmla="val 1849105"/>
+              </a:avLst>
+            </a:prstGeom>
+            <a:ln w="38100">
+              <a:solidFill>
+                <a:srgbClr val="38528C"/>
+              </a:solidFill>
+              <a:tailEnd type="triangle"/>
+            </a:ln>
+          </p:spPr>
+          <p:style>
+            <a:lnRef idx="1">
+              <a:schemeClr val="accent1"/>
+            </a:lnRef>
+            <a:fillRef idx="0">
+              <a:schemeClr val="accent1"/>
+            </a:fillRef>
+            <a:effectRef idx="0">
+              <a:schemeClr val="accent1"/>
+            </a:effectRef>
+            <a:fontRef idx="minor">
+              <a:schemeClr val="tx1"/>
+            </a:fontRef>
+          </p:style>
+          <p:txBody>
+            <a:bodyPr rtlCol="0" anchor="ctr"/>
+            <a:lstStyle/>
+            <a:p>
+              <a:pPr algn="ctr"/>
+              <a:endParaRPr lang="en-GB" sz="1200"/>
+            </a:p>
+          </p:txBody>
+        </p:sp>
+      </p:grpSp>
       <p:grpSp>
         <p:nvGrpSpPr>
           <p:cNvPr id="109" name="Group 108"/>
@@ -4274,10 +3808,10 @@
         </p:nvGrpSpPr>
         <p:grpSpPr>
           <a:xfrm>
-            <a:off x="2501900" y="3980260"/>
-            <a:ext cx="5871193" cy="2674540"/>
-            <a:chOff x="2501900" y="3980260"/>
-            <a:chExt cx="5871193" cy="2674540"/>
+            <a:off x="3389256" y="3921079"/>
+            <a:ext cx="3925541" cy="1978947"/>
+            <a:chOff x="2501900" y="3909831"/>
+            <a:chExt cx="5871193" cy="2959790"/>
           </a:xfrm>
         </p:grpSpPr>
         <p:cxnSp>
@@ -4352,68 +3886,6 @@
             </a:fontRef>
           </p:style>
         </p:cxnSp>
-        <p:sp>
-          <p:nvSpPr>
-            <p:cNvPr id="65" name="Oval 64"/>
-            <p:cNvSpPr/>
-            <p:nvPr/>
-          </p:nvSpPr>
-          <p:spPr>
-            <a:xfrm>
-              <a:off x="2890451" y="4197522"/>
-              <a:ext cx="807308" cy="807308"/>
-            </a:xfrm>
-            <a:prstGeom prst="ellipse">
-              <a:avLst/>
-            </a:prstGeom>
-            <a:solidFill>
-              <a:schemeClr val="bg1">
-                <a:lumMod val="85000"/>
-              </a:schemeClr>
-            </a:solidFill>
-            <a:ln w="28575">
-              <a:solidFill>
-                <a:srgbClr val="282828"/>
-              </a:solidFill>
-            </a:ln>
-          </p:spPr>
-          <p:style>
-            <a:lnRef idx="2">
-              <a:schemeClr val="accent1">
-                <a:shade val="50000"/>
-              </a:schemeClr>
-            </a:lnRef>
-            <a:fillRef idx="1">
-              <a:schemeClr val="accent1"/>
-            </a:fillRef>
-            <a:effectRef idx="0">
-              <a:schemeClr val="accent1"/>
-            </a:effectRef>
-            <a:fontRef idx="minor">
-              <a:schemeClr val="lt1"/>
-            </a:fontRef>
-          </p:style>
-          <p:txBody>
-            <a:bodyPr rtlCol="0" anchor="ctr"/>
-            <a:lstStyle/>
-            <a:p>
-              <a:pPr algn="ctr"/>
-              <a:r>
-                <a:rPr lang="en-GB" b="1" dirty="0" smtClean="0">
-                  <a:solidFill>
-                    <a:schemeClr val="tx1"/>
-                  </a:solidFill>
-                </a:rPr>
-                <a:t>E</a:t>
-              </a:r>
-              <a:endParaRPr lang="en-GB" b="1" dirty="0">
-                <a:solidFill>
-                  <a:schemeClr val="tx1"/>
-                </a:solidFill>
-              </a:endParaRPr>
-            </a:p>
-          </p:txBody>
-        </p:sp>
         <p:sp>
           <p:nvSpPr>
             <p:cNvPr id="66" name="Oval 65"/>
@@ -4461,7 +3933,7 @@
             <a:p>
               <a:pPr algn="ctr"/>
               <a:r>
-                <a:rPr lang="en-GB" b="1" dirty="0">
+                <a:rPr lang="en-GB" sz="1200" b="1" dirty="0">
                   <a:solidFill>
                     <a:schemeClr val="tx1"/>
                   </a:solidFill>
@@ -4514,10 +3986,10 @@
             <a:p>
               <a:pPr algn="ctr"/>
               <a:r>
-                <a:rPr lang="en-GB" b="1" dirty="0" smtClean="0"/>
+                <a:rPr lang="en-GB" sz="1200" b="1" dirty="0" smtClean="0"/>
                 <a:t>Excitation</a:t>
               </a:r>
-              <a:endParaRPr lang="en-GB" b="1" dirty="0"/>
+              <a:endParaRPr lang="en-GB" sz="1200" b="1" dirty="0"/>
             </a:p>
           </p:txBody>
         </p:sp>
@@ -4564,10 +4036,10 @@
             <a:p>
               <a:pPr algn="ctr"/>
               <a:r>
-                <a:rPr lang="en-GB" b="1" dirty="0" smtClean="0"/>
+                <a:rPr lang="en-GB" sz="1200" b="1" dirty="0" smtClean="0"/>
                 <a:t>Inhibition</a:t>
               </a:r>
-              <a:endParaRPr lang="en-GB" b="1" dirty="0"/>
+              <a:endParaRPr lang="en-GB" sz="1200" b="1" dirty="0"/>
             </a:p>
           </p:txBody>
         </p:sp>
@@ -4614,7 +4086,7 @@
             <a:lstStyle/>
             <a:p>
               <a:pPr algn="ctr"/>
-              <a:endParaRPr lang="en-GB"/>
+              <a:endParaRPr lang="en-GB" sz="1200"/>
             </a:p>
           </p:txBody>
         </p:sp>
@@ -4661,7 +4133,7 @@
             <a:lstStyle/>
             <a:p>
               <a:pPr algn="ctr"/>
-              <a:endParaRPr lang="en-GB"/>
+              <a:endParaRPr lang="en-GB" sz="1200"/>
             </a:p>
           </p:txBody>
         </p:sp>
@@ -4707,7 +4179,7 @@
             <a:lstStyle/>
             <a:p>
               <a:pPr algn="ctr"/>
-              <a:endParaRPr lang="en-GB"/>
+              <a:endParaRPr lang="en-GB" sz="1200"/>
             </a:p>
           </p:txBody>
         </p:sp>
@@ -4830,14 +4302,14 @@
             <a:p>
               <a:pPr algn="ctr"/>
               <a:r>
-                <a:rPr lang="en-GB" b="1" dirty="0" smtClean="0">
+                <a:rPr lang="en-GB" sz="1200" b="1" dirty="0" smtClean="0">
                   <a:solidFill>
                     <a:schemeClr val="tx1"/>
                   </a:solidFill>
                 </a:rPr>
                 <a:t>E</a:t>
               </a:r>
-              <a:endParaRPr lang="en-GB" b="1" dirty="0">
+              <a:endParaRPr lang="en-GB" sz="1200" b="1" dirty="0">
                 <a:solidFill>
                   <a:schemeClr val="tx1"/>
                 </a:solidFill>
@@ -4892,7 +4364,7 @@
             <a:p>
               <a:pPr algn="ctr"/>
               <a:r>
-                <a:rPr lang="en-GB" b="1" dirty="0">
+                <a:rPr lang="en-GB" sz="1200" b="1" dirty="0">
                   <a:solidFill>
                     <a:schemeClr val="tx1"/>
                   </a:solidFill>
@@ -4945,7 +4417,7 @@
             <a:lstStyle/>
             <a:p>
               <a:pPr algn="ctr"/>
-              <a:endParaRPr lang="en-GB"/>
+              <a:endParaRPr lang="en-GB" sz="1200"/>
             </a:p>
           </p:txBody>
         </p:sp>
@@ -4992,7 +4464,7 @@
             <a:lstStyle/>
             <a:p>
               <a:pPr algn="ctr"/>
-              <a:endParaRPr lang="en-GB"/>
+              <a:endParaRPr lang="en-GB" sz="1200"/>
             </a:p>
           </p:txBody>
         </p:sp>
@@ -5038,7 +4510,7 @@
             <a:lstStyle/>
             <a:p>
               <a:pPr algn="ctr"/>
-              <a:endParaRPr lang="en-GB"/>
+              <a:endParaRPr lang="en-GB" sz="1200"/>
             </a:p>
           </p:txBody>
         </p:sp>
@@ -5088,8 +4560,8 @@
           </p:nvSpPr>
           <p:spPr>
             <a:xfrm>
-              <a:off x="3707493" y="4009434"/>
-              <a:ext cx="354584" cy="307777"/>
+              <a:off x="3521764" y="3909831"/>
+              <a:ext cx="779888" cy="653561"/>
             </a:xfrm>
             <a:prstGeom prst="rect">
               <a:avLst/>
@@ -5103,10 +4575,10 @@
             <a:lstStyle/>
             <a:p>
               <a:r>
-                <a:rPr lang="en-GB" sz="1400" dirty="0" smtClean="0"/>
+                <a:rPr lang="en-GB" sz="1200" dirty="0" smtClean="0"/>
                 <a:t>SE</a:t>
               </a:r>
-              <a:endParaRPr lang="en-GB" sz="1400" dirty="0"/>
+              <a:endParaRPr lang="en-GB" sz="1200" dirty="0"/>
             </a:p>
           </p:txBody>
         </p:sp>
@@ -5118,8 +4590,8 @@
           </p:nvSpPr>
           <p:spPr>
             <a:xfrm>
-              <a:off x="4558471" y="4599910"/>
-              <a:ext cx="360996" cy="307777"/>
+              <a:off x="4397766" y="4485519"/>
+              <a:ext cx="791232" cy="653561"/>
             </a:xfrm>
             <a:prstGeom prst="rect">
               <a:avLst/>
@@ -5133,10 +4605,10 @@
             <a:lstStyle/>
             <a:p>
               <a:r>
-                <a:rPr lang="en-GB" sz="1400" dirty="0" smtClean="0"/>
+                <a:rPr lang="en-GB" sz="1200" dirty="0" smtClean="0"/>
                 <a:t>EE</a:t>
               </a:r>
-              <a:endParaRPr lang="en-GB" sz="1400" dirty="0"/>
+              <a:endParaRPr lang="en-GB" sz="1200" dirty="0"/>
             </a:p>
           </p:txBody>
         </p:sp>
@@ -5148,8 +4620,8 @@
           </p:nvSpPr>
           <p:spPr>
             <a:xfrm>
-              <a:off x="3802427" y="6146755"/>
-              <a:ext cx="311304" cy="307777"/>
+              <a:off x="3724382" y="6216060"/>
+              <a:ext cx="692895" cy="653561"/>
             </a:xfrm>
             <a:prstGeom prst="rect">
               <a:avLst/>
@@ -5163,10 +4635,10 @@
             <a:lstStyle/>
             <a:p>
               <a:r>
-                <a:rPr lang="en-GB" sz="1400" dirty="0" smtClean="0"/>
+                <a:rPr lang="en-GB" sz="1200" dirty="0" smtClean="0"/>
                 <a:t>SI</a:t>
               </a:r>
-              <a:endParaRPr lang="en-GB" sz="1400" dirty="0"/>
+              <a:endParaRPr lang="en-GB" sz="1200" dirty="0"/>
             </a:p>
           </p:txBody>
         </p:sp>
@@ -5178,8 +4650,8 @@
           </p:nvSpPr>
           <p:spPr>
             <a:xfrm>
-              <a:off x="2671509" y="5209813"/>
-              <a:ext cx="317716" cy="307777"/>
+              <a:off x="2614747" y="5209815"/>
+              <a:ext cx="704244" cy="653561"/>
             </a:xfrm>
             <a:prstGeom prst="rect">
               <a:avLst/>
@@ -5193,10 +4665,10 @@
             <a:lstStyle/>
             <a:p>
               <a:r>
-                <a:rPr lang="en-GB" sz="1400" dirty="0" smtClean="0"/>
+                <a:rPr lang="en-GB" sz="1200" dirty="0" smtClean="0"/>
                 <a:t>IE</a:t>
               </a:r>
-              <a:endParaRPr lang="en-GB" sz="1400" dirty="0"/>
+              <a:endParaRPr lang="en-GB" sz="1200" dirty="0"/>
             </a:p>
           </p:txBody>
         </p:sp>
@@ -5208,8 +4680,8 @@
           </p:nvSpPr>
           <p:spPr>
             <a:xfrm>
-              <a:off x="3572381" y="5209813"/>
-              <a:ext cx="317716" cy="307777"/>
+              <a:off x="3572381" y="5209814"/>
+              <a:ext cx="704244" cy="653561"/>
             </a:xfrm>
             <a:prstGeom prst="rect">
               <a:avLst/>
@@ -5223,10 +4695,72 @@
             <a:lstStyle/>
             <a:p>
               <a:r>
-                <a:rPr lang="en-GB" sz="1400" dirty="0" smtClean="0"/>
+                <a:rPr lang="en-GB" sz="1200" dirty="0" smtClean="0"/>
                 <a:t>EI</a:t>
               </a:r>
-              <a:endParaRPr lang="en-GB" sz="1400" dirty="0"/>
+              <a:endParaRPr lang="en-GB" sz="1200" dirty="0"/>
+            </a:p>
+          </p:txBody>
+        </p:sp>
+        <p:sp>
+          <p:nvSpPr>
+            <p:cNvPr id="65" name="Oval 64"/>
+            <p:cNvSpPr/>
+            <p:nvPr/>
+          </p:nvSpPr>
+          <p:spPr>
+            <a:xfrm>
+              <a:off x="2890451" y="4197522"/>
+              <a:ext cx="807308" cy="807308"/>
+            </a:xfrm>
+            <a:prstGeom prst="ellipse">
+              <a:avLst/>
+            </a:prstGeom>
+            <a:solidFill>
+              <a:schemeClr val="bg1">
+                <a:lumMod val="85000"/>
+              </a:schemeClr>
+            </a:solidFill>
+            <a:ln w="28575">
+              <a:solidFill>
+                <a:srgbClr val="282828"/>
+              </a:solidFill>
+            </a:ln>
+          </p:spPr>
+          <p:style>
+            <a:lnRef idx="2">
+              <a:schemeClr val="accent1">
+                <a:shade val="50000"/>
+              </a:schemeClr>
+            </a:lnRef>
+            <a:fillRef idx="1">
+              <a:schemeClr val="accent1"/>
+            </a:fillRef>
+            <a:effectRef idx="0">
+              <a:schemeClr val="accent1"/>
+            </a:effectRef>
+            <a:fontRef idx="minor">
+              <a:schemeClr val="lt1"/>
+            </a:fontRef>
+          </p:style>
+          <p:txBody>
+            <a:bodyPr rtlCol="0" anchor="ctr"/>
+            <a:lstStyle/>
+            <a:p>
+              <a:pPr algn="ctr"/>
+              <a:r>
+                <a:rPr lang="en-GB" sz="1200" b="1" dirty="0" smtClean="0">
+                  <a:solidFill>
+                    <a:schemeClr val="tx1"/>
+                  </a:solidFill>
+                </a:rPr>
+                <a:t>E</a:t>
+              </a:r>
+              <a:endParaRPr lang="en-GB" sz="1200" b="1" dirty="0">
+                <a:solidFill>
+                  <a:schemeClr val="tx1"/>
+                </a:solidFill>
+              </a:endParaRPr>
             </a:p>
           </p:txBody>
         </p:sp>
@@ -5261,210 +4795,713 @@
           </a:p>
         </p:txBody>
       </p:sp>
-      <mc:AlternateContent xmlns:mc="http://schemas.openxmlformats.org/markup-compatibility/2006">
-        <mc:Choice xmlns:a14="http://schemas.microsoft.com/office/drawing/2010/main" Requires="a14">
-          <p:sp>
-            <p:nvSpPr>
-              <p:cNvPr id="110" name="TextBox 109"/>
-              <p:cNvSpPr txBox="1"/>
-              <p:nvPr/>
-            </p:nvSpPr>
-            <p:spPr>
-              <a:xfrm>
-                <a:off x="1100018" y="2475049"/>
-                <a:ext cx="430182" cy="353943"/>
-              </a:xfrm>
-              <a:prstGeom prst="rect">
-                <a:avLst/>
-              </a:prstGeom>
+      <p:grpSp>
+        <p:nvGrpSpPr>
+          <p:cNvPr id="2" name="Group 1"/>
+          <p:cNvGrpSpPr/>
+          <p:nvPr/>
+        </p:nvGrpSpPr>
+        <p:grpSpPr>
+          <a:xfrm>
+            <a:off x="1505122" y="715836"/>
+            <a:ext cx="1385329" cy="1472502"/>
+            <a:chOff x="674130" y="768522"/>
+            <a:chExt cx="2495550" cy="2652584"/>
+          </a:xfrm>
+        </p:grpSpPr>
+        <p:sp>
+          <p:nvSpPr>
+            <p:cNvPr id="73" name="Arc 72"/>
+            <p:cNvSpPr/>
+            <p:nvPr/>
+          </p:nvSpPr>
+          <p:spPr>
+            <a:xfrm rot="4386381">
+              <a:off x="2087549" y="2424995"/>
+              <a:ext cx="451817" cy="487063"/>
+            </a:xfrm>
+            <a:prstGeom prst="arc">
+              <a:avLst>
+                <a:gd name="adj1" fmla="val 10278105"/>
+                <a:gd name="adj2" fmla="val 1849105"/>
+              </a:avLst>
+            </a:prstGeom>
+            <a:ln w="38100">
+              <a:solidFill>
+                <a:srgbClr val="38528C"/>
+              </a:solidFill>
+              <a:tailEnd type="triangle"/>
+            </a:ln>
+          </p:spPr>
+          <p:style>
+            <a:lnRef idx="1">
+              <a:schemeClr val="accent1"/>
+            </a:lnRef>
+            <a:fillRef idx="0">
+              <a:schemeClr val="accent1"/>
+            </a:fillRef>
+            <a:effectRef idx="0">
+              <a:schemeClr val="accent1"/>
+            </a:effectRef>
+            <a:fontRef idx="minor">
+              <a:schemeClr val="tx1"/>
+            </a:fontRef>
+          </p:style>
+          <p:txBody>
+            <a:bodyPr rtlCol="0" anchor="ctr"/>
+            <a:lstStyle/>
+            <a:p>
+              <a:pPr algn="ctr"/>
+              <a:endParaRPr lang="en-GB" sz="1200"/>
+            </a:p>
+          </p:txBody>
+        </p:sp>
+        <p:sp>
+          <p:nvSpPr>
+            <p:cNvPr id="74" name="Arc 73"/>
+            <p:cNvSpPr/>
+            <p:nvPr/>
+          </p:nvSpPr>
+          <p:spPr>
+            <a:xfrm rot="3524505">
+              <a:off x="2087551" y="884816"/>
+              <a:ext cx="451817" cy="487063"/>
+            </a:xfrm>
+            <a:prstGeom prst="arc">
+              <a:avLst>
+                <a:gd name="adj1" fmla="val 10278105"/>
+                <a:gd name="adj2" fmla="val 1849105"/>
+              </a:avLst>
+            </a:prstGeom>
+            <a:ln w="38100">
+              <a:solidFill>
+                <a:srgbClr val="38528C"/>
+              </a:solidFill>
+              <a:tailEnd type="triangle"/>
+            </a:ln>
+          </p:spPr>
+          <p:style>
+            <a:lnRef idx="1">
+              <a:schemeClr val="accent1"/>
+            </a:lnRef>
+            <a:fillRef idx="0">
+              <a:schemeClr val="accent1"/>
+            </a:fillRef>
+            <a:effectRef idx="0">
+              <a:schemeClr val="accent1"/>
+            </a:effectRef>
+            <a:fontRef idx="minor">
+              <a:schemeClr val="tx1"/>
+            </a:fontRef>
+          </p:style>
+          <p:txBody>
+            <a:bodyPr rtlCol="0" anchor="ctr"/>
+            <a:lstStyle/>
+            <a:p>
+              <a:pPr algn="ctr"/>
+              <a:endParaRPr lang="en-GB" sz="1200"/>
+            </a:p>
+          </p:txBody>
+        </p:sp>
+        <p:cxnSp>
+          <p:nvCxnSpPr>
+            <p:cNvPr id="10" name="Straight Arrow Connector 9"/>
+            <p:cNvCxnSpPr/>
+            <p:nvPr/>
+          </p:nvCxnSpPr>
+          <p:spPr>
+            <a:xfrm flipV="1">
+              <a:off x="1624379" y="1533802"/>
+              <a:ext cx="0" cy="874883"/>
+            </a:xfrm>
+            <a:prstGeom prst="straightConnector1">
+              <a:avLst/>
+            </a:prstGeom>
+            <a:ln w="38100">
+              <a:solidFill>
+                <a:srgbClr val="38528C"/>
+              </a:solidFill>
+              <a:tailEnd type="triangle"/>
+            </a:ln>
+          </p:spPr>
+          <p:style>
+            <a:lnRef idx="1">
+              <a:schemeClr val="accent1"/>
+            </a:lnRef>
+            <a:fillRef idx="0">
+              <a:schemeClr val="accent1"/>
+            </a:fillRef>
+            <a:effectRef idx="0">
+              <a:schemeClr val="accent1"/>
+            </a:effectRef>
+            <a:fontRef idx="minor">
+              <a:schemeClr val="tx1"/>
+            </a:fontRef>
+          </p:style>
+        </p:cxnSp>
+        <p:cxnSp>
+          <p:nvCxnSpPr>
+            <p:cNvPr id="12" name="Straight Arrow Connector 11"/>
+            <p:cNvCxnSpPr/>
+            <p:nvPr/>
+          </p:nvCxnSpPr>
+          <p:spPr>
+            <a:xfrm>
+              <a:off x="2195231" y="1394102"/>
+              <a:ext cx="0" cy="874883"/>
+            </a:xfrm>
+            <a:prstGeom prst="straightConnector1">
+              <a:avLst/>
+            </a:prstGeom>
+            <a:ln w="38100">
+              <a:solidFill>
+                <a:srgbClr val="38528C"/>
+              </a:solidFill>
+              <a:tailEnd type="triangle"/>
+            </a:ln>
+          </p:spPr>
+          <p:style>
+            <a:lnRef idx="1">
+              <a:schemeClr val="accent1"/>
+            </a:lnRef>
+            <a:fillRef idx="0">
+              <a:schemeClr val="accent1"/>
+            </a:fillRef>
+            <a:effectRef idx="0">
+              <a:schemeClr val="accent1"/>
+            </a:effectRef>
+            <a:fontRef idx="minor">
+              <a:schemeClr val="tx1"/>
+            </a:fontRef>
+          </p:style>
+        </p:cxnSp>
+        <p:sp>
+          <p:nvSpPr>
+            <p:cNvPr id="7" name="Oval 6"/>
+            <p:cNvSpPr/>
+            <p:nvPr/>
+          </p:nvSpPr>
+          <p:spPr>
+            <a:xfrm>
+              <a:off x="1506151" y="768522"/>
+              <a:ext cx="807308" cy="807308"/>
+            </a:xfrm>
+            <a:prstGeom prst="ellipse">
+              <a:avLst/>
+            </a:prstGeom>
+            <a:solidFill>
+              <a:srgbClr val="99DF8D"/>
+            </a:solidFill>
+            <a:ln w="28575">
+              <a:solidFill>
+                <a:srgbClr val="187509"/>
+              </a:solidFill>
+            </a:ln>
+          </p:spPr>
+          <p:style>
+            <a:lnRef idx="2">
+              <a:schemeClr val="accent1">
+                <a:shade val="50000"/>
+              </a:schemeClr>
+            </a:lnRef>
+            <a:fillRef idx="1">
+              <a:schemeClr val="accent1"/>
+            </a:fillRef>
+            <a:effectRef idx="0">
+              <a:schemeClr val="accent1"/>
+            </a:effectRef>
+            <a:fontRef idx="minor">
+              <a:schemeClr val="lt1"/>
+            </a:fontRef>
+          </p:style>
+          <p:txBody>
+            <a:bodyPr rtlCol="0" anchor="ctr"/>
+            <a:lstStyle/>
+            <a:p>
+              <a:pPr algn="ctr"/>
+              <a:endParaRPr lang="en-GB" sz="1200"/>
+            </a:p>
+          </p:txBody>
+        </p:sp>
+        <p:sp>
+          <p:nvSpPr>
+            <p:cNvPr id="9" name="Oval 8"/>
+            <p:cNvSpPr/>
+            <p:nvPr/>
+          </p:nvSpPr>
+          <p:spPr>
+            <a:xfrm>
+              <a:off x="1506151" y="2214257"/>
+              <a:ext cx="807308" cy="807308"/>
+            </a:xfrm>
+            <a:prstGeom prst="ellipse">
+              <a:avLst/>
+            </a:prstGeom>
+            <a:solidFill>
+              <a:srgbClr val="99DF8D"/>
+            </a:solidFill>
+            <a:ln w="28575">
+              <a:solidFill>
+                <a:srgbClr val="187509"/>
+              </a:solidFill>
+            </a:ln>
+          </p:spPr>
+          <p:style>
+            <a:lnRef idx="2">
+              <a:schemeClr val="accent1">
+                <a:shade val="50000"/>
+              </a:schemeClr>
+            </a:lnRef>
+            <a:fillRef idx="1">
+              <a:schemeClr val="accent1"/>
+            </a:fillRef>
+            <a:effectRef idx="0">
+              <a:schemeClr val="accent1"/>
+            </a:effectRef>
+            <a:fontRef idx="minor">
+              <a:schemeClr val="lt1"/>
+            </a:fontRef>
+          </p:style>
+          <p:txBody>
+            <a:bodyPr rtlCol="0" anchor="ctr"/>
+            <a:lstStyle/>
+            <a:p>
+              <a:pPr algn="ctr"/>
+              <a:endParaRPr lang="en-GB" sz="1200"/>
+            </a:p>
+          </p:txBody>
+        </p:sp>
+        <p:cxnSp>
+          <p:nvCxnSpPr>
+            <p:cNvPr id="17" name="Straight Arrow Connector 16"/>
+            <p:cNvCxnSpPr>
+              <a:endCxn id="9" idx="4"/>
+            </p:cNvCxnSpPr>
+            <p:nvPr/>
+          </p:nvCxnSpPr>
+          <p:spPr>
+            <a:xfrm flipV="1">
+              <a:off x="1909805" y="3021565"/>
+              <a:ext cx="0" cy="399541"/>
+            </a:xfrm>
+            <a:prstGeom prst="straightConnector1">
+              <a:avLst/>
+            </a:prstGeom>
+            <a:ln w="38100">
+              <a:solidFill>
+                <a:srgbClr val="CC444E"/>
+              </a:solidFill>
+              <a:tailEnd type="triangle"/>
+            </a:ln>
+          </p:spPr>
+          <p:style>
+            <a:lnRef idx="1">
+              <a:schemeClr val="accent1"/>
+            </a:lnRef>
+            <a:fillRef idx="0">
+              <a:schemeClr val="accent1"/>
+            </a:fillRef>
+            <a:effectRef idx="0">
+              <a:schemeClr val="accent1"/>
+            </a:effectRef>
+            <a:fontRef idx="minor">
+              <a:schemeClr val="tx1"/>
+            </a:fontRef>
+          </p:style>
+        </p:cxnSp>
+        <p:cxnSp>
+          <p:nvCxnSpPr>
+            <p:cNvPr id="23" name="Straight Connector 22"/>
+            <p:cNvCxnSpPr/>
+            <p:nvPr/>
+          </p:nvCxnSpPr>
+          <p:spPr>
+            <a:xfrm>
+              <a:off x="674130" y="1963008"/>
+              <a:ext cx="950249" cy="0"/>
+            </a:xfrm>
+            <a:prstGeom prst="line">
+              <a:avLst/>
+            </a:prstGeom>
+            <a:ln w="38100">
+              <a:solidFill>
+                <a:srgbClr val="D1A245"/>
+              </a:solidFill>
+              <a:tailEnd type="oval"/>
+            </a:ln>
+          </p:spPr>
+          <p:style>
+            <a:lnRef idx="1">
+              <a:schemeClr val="accent1"/>
+            </a:lnRef>
+            <a:fillRef idx="0">
+              <a:schemeClr val="accent1"/>
+            </a:fillRef>
+            <a:effectRef idx="0">
+              <a:schemeClr val="accent1"/>
+            </a:effectRef>
+            <a:fontRef idx="minor">
+              <a:schemeClr val="tx1"/>
+            </a:fontRef>
+          </p:style>
+        </p:cxnSp>
+        <p:sp>
+          <p:nvSpPr>
+            <p:cNvPr id="28" name="Rectangle 27"/>
+            <p:cNvSpPr/>
+            <p:nvPr/>
+          </p:nvSpPr>
+          <p:spPr>
+            <a:xfrm>
+              <a:off x="2766026" y="1222981"/>
+              <a:ext cx="403654" cy="403654"/>
+            </a:xfrm>
+            <a:prstGeom prst="rect">
+              <a:avLst/>
+            </a:prstGeom>
+            <a:solidFill>
+              <a:srgbClr val="38528C"/>
+            </a:solidFill>
+            <a:ln>
               <a:noFill/>
-            </p:spPr>
-            <p:txBody>
-              <a:bodyPr wrap="none" rtlCol="0">
-                <a:spAutoFit/>
-              </a:bodyPr>
-              <a:lstStyle/>
-              <a:p>
-                <a14:m>
-                  <m:oMathPara xmlns:m="http://schemas.openxmlformats.org/officeDocument/2006/math">
-                    <m:oMathParaPr>
-                      <m:jc m:val="centerGroup"/>
-                    </m:oMathParaPr>
-                    <m:oMath xmlns:m="http://schemas.openxmlformats.org/officeDocument/2006/math">
-                      <m:sSub>
-                        <m:sSubPr>
-                          <m:ctrlPr>
-                            <a:rPr lang="en-GB" sz="1700" b="0" i="1" dirty="0" smtClean="0">
-                              <a:latin typeface="Cambria Math" panose="02040503050406030204" pitchFamily="18" charset="0"/>
-                            </a:rPr>
-                          </m:ctrlPr>
-                        </m:sSubPr>
-                        <m:e>
-                          <m:r>
-                            <a:rPr lang="en-GB" sz="1700" i="1" dirty="0" smtClean="0">
-                              <a:latin typeface="Cambria Math" panose="02040503050406030204" pitchFamily="18" charset="0"/>
-                            </a:rPr>
-                            <m:t>𝑧</m:t>
-                          </m:r>
-                        </m:e>
-                        <m:sub>
-                          <m:r>
-                            <a:rPr lang="en-GB" sz="1700" b="0" i="1" dirty="0" smtClean="0">
-                              <a:latin typeface="Cambria Math" panose="02040503050406030204" pitchFamily="18" charset="0"/>
-                            </a:rPr>
-                            <m:t>1</m:t>
-                          </m:r>
-                        </m:sub>
-                      </m:sSub>
-                    </m:oMath>
-                  </m:oMathPara>
-                </a14:m>
-                <a:endParaRPr lang="en-GB" sz="1700" dirty="0"/>
-              </a:p>
-            </p:txBody>
-          </p:sp>
-        </mc:Choice>
-        <mc:Fallback>
-          <p:sp>
-            <p:nvSpPr>
-              <p:cNvPr id="110" name="TextBox 109"/>
-              <p:cNvSpPr txBox="1">
-                <a:spLocks noRot="1" noChangeAspect="1" noMove="1" noResize="1" noEditPoints="1" noAdjustHandles="1" noChangeArrowheads="1" noChangeShapeType="1" noTextEdit="1"/>
-              </p:cNvSpPr>
-              <p:nvPr/>
-            </p:nvSpPr>
-            <p:spPr>
-              <a:xfrm>
-                <a:off x="1100018" y="2475049"/>
-                <a:ext cx="430182" cy="353943"/>
-              </a:xfrm>
-              <a:prstGeom prst="rect">
-                <a:avLst/>
-              </a:prstGeom>
-              <a:blipFill rotWithShape="0">
-                <a:blip r:embed="rId2"/>
-                <a:stretch>
-                  <a:fillRect/>
-                </a:stretch>
-              </a:blipFill>
-            </p:spPr>
-            <p:txBody>
-              <a:bodyPr/>
-              <a:lstStyle/>
-              <a:p>
-                <a:r>
-                  <a:rPr lang="en-GB">
-                    <a:noFill/>
-                  </a:rPr>
-                  <a:t> </a:t>
-                </a:r>
-              </a:p>
-            </p:txBody>
-          </p:sp>
-        </mc:Fallback>
-      </mc:AlternateContent>
-      <mc:AlternateContent xmlns:mc="http://schemas.openxmlformats.org/markup-compatibility/2006">
-        <mc:Choice xmlns:a14="http://schemas.microsoft.com/office/drawing/2010/main" Requires="a14">
-          <p:sp>
-            <p:nvSpPr>
-              <p:cNvPr id="111" name="TextBox 110"/>
-              <p:cNvSpPr txBox="1"/>
-              <p:nvPr/>
-            </p:nvSpPr>
-            <p:spPr>
-              <a:xfrm>
-                <a:off x="1100018" y="951375"/>
-                <a:ext cx="430182" cy="353943"/>
-              </a:xfrm>
-              <a:prstGeom prst="rect">
-                <a:avLst/>
-              </a:prstGeom>
+            </a:ln>
+          </p:spPr>
+          <p:style>
+            <a:lnRef idx="2">
+              <a:schemeClr val="accent1">
+                <a:shade val="50000"/>
+              </a:schemeClr>
+            </a:lnRef>
+            <a:fillRef idx="1">
+              <a:schemeClr val="accent1"/>
+            </a:fillRef>
+            <a:effectRef idx="0">
+              <a:schemeClr val="accent1"/>
+            </a:effectRef>
+            <a:fontRef idx="minor">
+              <a:schemeClr val="lt1"/>
+            </a:fontRef>
+          </p:style>
+          <p:txBody>
+            <a:bodyPr rtlCol="0" anchor="ctr"/>
+            <a:lstStyle/>
+            <a:p>
+              <a:pPr algn="ctr"/>
+              <a:r>
+                <a:rPr lang="en-GB" sz="1200" b="1" dirty="0" smtClean="0"/>
+                <a:t>A</a:t>
+              </a:r>
+              <a:endParaRPr lang="en-GB" sz="1200" b="1" dirty="0"/>
+            </a:p>
+          </p:txBody>
+        </p:sp>
+        <p:sp>
+          <p:nvSpPr>
+            <p:cNvPr id="30" name="Rectangle 29"/>
+            <p:cNvSpPr/>
+            <p:nvPr/>
+          </p:nvSpPr>
+          <p:spPr>
+            <a:xfrm>
+              <a:off x="2766026" y="1672281"/>
+              <a:ext cx="403654" cy="403654"/>
+            </a:xfrm>
+            <a:prstGeom prst="rect">
+              <a:avLst/>
+            </a:prstGeom>
+            <a:solidFill>
+              <a:srgbClr val="D1A245"/>
+            </a:solidFill>
+            <a:ln>
               <a:noFill/>
-            </p:spPr>
-            <p:txBody>
-              <a:bodyPr wrap="square" rtlCol="0">
-                <a:spAutoFit/>
-              </a:bodyPr>
-              <a:lstStyle/>
-              <a:p>
-                <a14:m>
-                  <m:oMathPara xmlns:m="http://schemas.openxmlformats.org/officeDocument/2006/math">
-                    <m:oMathParaPr>
-                      <m:jc m:val="centerGroup"/>
-                    </m:oMathParaPr>
-                    <m:oMath xmlns:m="http://schemas.openxmlformats.org/officeDocument/2006/math">
-                      <m:sSub>
-                        <m:sSubPr>
-                          <m:ctrlPr>
-                            <a:rPr lang="en-GB" sz="1700" b="0" i="1" dirty="0" smtClean="0">
-                              <a:latin typeface="Cambria Math" panose="02040503050406030204" pitchFamily="18" charset="0"/>
-                            </a:rPr>
-                          </m:ctrlPr>
-                        </m:sSubPr>
-                        <m:e>
-                          <m:r>
-                            <a:rPr lang="en-GB" sz="1700" i="1" dirty="0" smtClean="0">
-                              <a:latin typeface="Cambria Math" panose="02040503050406030204" pitchFamily="18" charset="0"/>
-                            </a:rPr>
-                            <m:t>𝑧</m:t>
-                          </m:r>
-                        </m:e>
-                        <m:sub>
-                          <m:r>
-                            <a:rPr lang="en-GB" sz="1700" b="0" i="1" dirty="0" smtClean="0">
-                              <a:latin typeface="Cambria Math" panose="02040503050406030204" pitchFamily="18" charset="0"/>
-                            </a:rPr>
-                            <m:t>2</m:t>
-                          </m:r>
-                        </m:sub>
-                      </m:sSub>
-                    </m:oMath>
-                  </m:oMathPara>
-                </a14:m>
-                <a:endParaRPr lang="en-GB" sz="1700" dirty="0"/>
-              </a:p>
-            </p:txBody>
-          </p:sp>
-        </mc:Choice>
-        <mc:Fallback>
-          <p:sp>
-            <p:nvSpPr>
-              <p:cNvPr id="111" name="TextBox 110"/>
-              <p:cNvSpPr txBox="1">
-                <a:spLocks noRot="1" noChangeAspect="1" noMove="1" noResize="1" noEditPoints="1" noAdjustHandles="1" noChangeArrowheads="1" noChangeShapeType="1" noTextEdit="1"/>
-              </p:cNvSpPr>
-              <p:nvPr/>
-            </p:nvSpPr>
-            <p:spPr>
-              <a:xfrm>
-                <a:off x="1100018" y="951375"/>
-                <a:ext cx="430182" cy="353943"/>
-              </a:xfrm>
-              <a:prstGeom prst="rect">
-                <a:avLst/>
-              </a:prstGeom>
-              <a:blipFill rotWithShape="0">
-                <a:blip r:embed="rId3"/>
-                <a:stretch>
-                  <a:fillRect/>
-                </a:stretch>
-              </a:blipFill>
-            </p:spPr>
-            <p:txBody>
-              <a:bodyPr/>
-              <a:lstStyle/>
-              <a:p>
-                <a:r>
-                  <a:rPr lang="en-GB">
-                    <a:noFill/>
-                  </a:rPr>
-                  <a:t> </a:t>
-                </a:r>
-              </a:p>
-            </p:txBody>
-          </p:sp>
-        </mc:Fallback>
-      </mc:AlternateContent>
+            </a:ln>
+          </p:spPr>
+          <p:style>
+            <a:lnRef idx="2">
+              <a:schemeClr val="accent1">
+                <a:shade val="50000"/>
+              </a:schemeClr>
+            </a:lnRef>
+            <a:fillRef idx="1">
+              <a:schemeClr val="accent1"/>
+            </a:fillRef>
+            <a:effectRef idx="0">
+              <a:schemeClr val="accent1"/>
+            </a:effectRef>
+            <a:fontRef idx="minor">
+              <a:schemeClr val="lt1"/>
+            </a:fontRef>
+          </p:style>
+          <p:txBody>
+            <a:bodyPr rtlCol="0" anchor="ctr"/>
+            <a:lstStyle/>
+            <a:p>
+              <a:pPr algn="ctr"/>
+              <a:r>
+                <a:rPr lang="en-GB" sz="1200" b="1" dirty="0" smtClean="0"/>
+                <a:t>B</a:t>
+              </a:r>
+              <a:endParaRPr lang="en-GB" sz="1200" b="1" dirty="0"/>
+            </a:p>
+          </p:txBody>
+        </p:sp>
+        <p:sp>
+          <p:nvSpPr>
+            <p:cNvPr id="31" name="Rectangle 30"/>
+            <p:cNvSpPr/>
+            <p:nvPr/>
+          </p:nvSpPr>
+          <p:spPr>
+            <a:xfrm>
+              <a:off x="2766026" y="2116781"/>
+              <a:ext cx="403654" cy="403654"/>
+            </a:xfrm>
+            <a:prstGeom prst="rect">
+              <a:avLst/>
+            </a:prstGeom>
+            <a:solidFill>
+              <a:srgbClr val="CC444E"/>
+            </a:solidFill>
+            <a:ln>
+              <a:noFill/>
+            </a:ln>
+          </p:spPr>
+          <p:style>
+            <a:lnRef idx="2">
+              <a:schemeClr val="accent1">
+                <a:shade val="50000"/>
+              </a:schemeClr>
+            </a:lnRef>
+            <a:fillRef idx="1">
+              <a:schemeClr val="accent1"/>
+            </a:fillRef>
+            <a:effectRef idx="0">
+              <a:schemeClr val="accent1"/>
+            </a:effectRef>
+            <a:fontRef idx="minor">
+              <a:schemeClr val="lt1"/>
+            </a:fontRef>
+          </p:style>
+          <p:txBody>
+            <a:bodyPr rtlCol="0" anchor="ctr"/>
+            <a:lstStyle/>
+            <a:p>
+              <a:pPr algn="ctr"/>
+              <a:r>
+                <a:rPr lang="en-GB" sz="1200" b="1" dirty="0" smtClean="0"/>
+                <a:t>C</a:t>
+              </a:r>
+              <a:endParaRPr lang="en-GB" sz="1200" b="1" dirty="0"/>
+            </a:p>
+          </p:txBody>
+        </p:sp>
+        <mc:AlternateContent xmlns:mc="http://schemas.openxmlformats.org/markup-compatibility/2006">
+          <mc:Choice xmlns:a14="http://schemas.microsoft.com/office/drawing/2010/main" Requires="a14">
+            <p:sp>
+              <p:nvSpPr>
+                <p:cNvPr id="110" name="TextBox 109"/>
+                <p:cNvSpPr txBox="1"/>
+                <p:nvPr/>
+              </p:nvSpPr>
+              <p:spPr>
+                <a:xfrm>
+                  <a:off x="981298" y="2475051"/>
+                  <a:ext cx="645682" cy="498990"/>
+                </a:xfrm>
+                <a:prstGeom prst="rect">
+                  <a:avLst/>
+                </a:prstGeom>
+                <a:noFill/>
+              </p:spPr>
+              <p:txBody>
+                <a:bodyPr wrap="none" rtlCol="0">
+                  <a:spAutoFit/>
+                </a:bodyPr>
+                <a:lstStyle/>
+                <a:p>
+                  <a:pPr/>
+                  <a14:m>
+                    <m:oMathPara xmlns:m="http://schemas.openxmlformats.org/officeDocument/2006/math">
+                      <m:oMathParaPr>
+                        <m:jc m:val="centerGroup"/>
+                      </m:oMathParaPr>
+                      <m:oMath xmlns:m="http://schemas.openxmlformats.org/officeDocument/2006/math">
+                        <m:sSub>
+                          <m:sSubPr>
+                            <m:ctrlPr>
+                              <a:rPr lang="en-GB" sz="1200" b="0" i="1" dirty="0" smtClean="0">
+                                <a:latin typeface="Cambria Math" panose="02040503050406030204" pitchFamily="18" charset="0"/>
+                              </a:rPr>
+                            </m:ctrlPr>
+                          </m:sSubPr>
+                          <m:e>
+                            <m:r>
+                              <a:rPr lang="en-GB" sz="1200" i="1" dirty="0" smtClean="0">
+                                <a:latin typeface="Cambria Math" panose="02040503050406030204" pitchFamily="18" charset="0"/>
+                              </a:rPr>
+                              <m:t>𝑧</m:t>
+                            </m:r>
+                          </m:e>
+                          <m:sub>
+                            <m:r>
+                              <a:rPr lang="en-GB" sz="1200" b="0" i="1" dirty="0" smtClean="0">
+                                <a:latin typeface="Cambria Math" panose="02040503050406030204" pitchFamily="18" charset="0"/>
+                              </a:rPr>
+                              <m:t>1</m:t>
+                            </m:r>
+                          </m:sub>
+                        </m:sSub>
+                      </m:oMath>
+                    </m:oMathPara>
+                  </a14:m>
+                  <a:endParaRPr lang="en-GB" sz="1200" dirty="0"/>
+                </a:p>
+              </p:txBody>
+            </p:sp>
+          </mc:Choice>
+          <mc:Fallback>
+            <p:sp>
+              <p:nvSpPr>
+                <p:cNvPr id="110" name="TextBox 109"/>
+                <p:cNvSpPr txBox="1">
+                  <a:spLocks noRot="1" noChangeAspect="1" noMove="1" noResize="1" noEditPoints="1" noAdjustHandles="1" noChangeArrowheads="1" noChangeShapeType="1" noTextEdit="1"/>
+                </p:cNvSpPr>
+                <p:nvPr/>
+              </p:nvSpPr>
+              <p:spPr>
+                <a:xfrm>
+                  <a:off x="981298" y="2475051"/>
+                  <a:ext cx="645682" cy="498990"/>
+                </a:xfrm>
+                <a:prstGeom prst="rect">
+                  <a:avLst/>
+                </a:prstGeom>
+                <a:blipFill rotWithShape="0">
+                  <a:blip r:embed="rId2"/>
+                  <a:stretch>
+                    <a:fillRect/>
+                  </a:stretch>
+                </a:blipFill>
+              </p:spPr>
+              <p:txBody>
+                <a:bodyPr/>
+                <a:lstStyle/>
+                <a:p>
+                  <a:r>
+                    <a:rPr lang="en-GB">
+                      <a:noFill/>
+                    </a:rPr>
+                    <a:t> </a:t>
+                  </a:r>
+                </a:p>
+              </p:txBody>
+            </p:sp>
+          </mc:Fallback>
+        </mc:AlternateContent>
+        <mc:AlternateContent xmlns:mc="http://schemas.openxmlformats.org/markup-compatibility/2006">
+          <mc:Choice xmlns:a14="http://schemas.microsoft.com/office/drawing/2010/main" Requires="a14">
+            <p:sp>
+              <p:nvSpPr>
+                <p:cNvPr id="111" name="TextBox 110"/>
+                <p:cNvSpPr txBox="1"/>
+                <p:nvPr/>
+              </p:nvSpPr>
+              <p:spPr>
+                <a:xfrm>
+                  <a:off x="981298" y="951374"/>
+                  <a:ext cx="430183" cy="498990"/>
+                </a:xfrm>
+                <a:prstGeom prst="rect">
+                  <a:avLst/>
+                </a:prstGeom>
+                <a:noFill/>
+              </p:spPr>
+              <p:txBody>
+                <a:bodyPr wrap="square" rtlCol="0">
+                  <a:spAutoFit/>
+                </a:bodyPr>
+                <a:lstStyle/>
+                <a:p>
+                  <a:pPr/>
+                  <a14:m>
+                    <m:oMathPara xmlns:m="http://schemas.openxmlformats.org/officeDocument/2006/math">
+                      <m:oMathParaPr>
+                        <m:jc m:val="centerGroup"/>
+                      </m:oMathParaPr>
+                      <m:oMath xmlns:m="http://schemas.openxmlformats.org/officeDocument/2006/math">
+                        <m:sSub>
+                          <m:sSubPr>
+                            <m:ctrlPr>
+                              <a:rPr lang="en-GB" sz="1200" b="0" i="1" dirty="0" smtClean="0">
+                                <a:latin typeface="Cambria Math" panose="02040503050406030204" pitchFamily="18" charset="0"/>
+                              </a:rPr>
+                            </m:ctrlPr>
+                          </m:sSubPr>
+                          <m:e>
+                            <m:r>
+                              <a:rPr lang="en-GB" sz="1200" i="1" dirty="0" smtClean="0">
+                                <a:latin typeface="Cambria Math" panose="02040503050406030204" pitchFamily="18" charset="0"/>
+                              </a:rPr>
+                              <m:t>𝑧</m:t>
+                            </m:r>
+                          </m:e>
+                          <m:sub>
+                            <m:r>
+                              <a:rPr lang="en-GB" sz="1200" b="0" i="1" dirty="0" smtClean="0">
+                                <a:latin typeface="Cambria Math" panose="02040503050406030204" pitchFamily="18" charset="0"/>
+                              </a:rPr>
+                              <m:t>2</m:t>
+                            </m:r>
+                          </m:sub>
+                        </m:sSub>
+                      </m:oMath>
+                    </m:oMathPara>
+                  </a14:m>
+                  <a:endParaRPr lang="en-GB" sz="1200" dirty="0"/>
+                </a:p>
+              </p:txBody>
+            </p:sp>
+          </mc:Choice>
+          <mc:Fallback>
+            <p:sp>
+              <p:nvSpPr>
+                <p:cNvPr id="111" name="TextBox 110"/>
+                <p:cNvSpPr txBox="1">
+                  <a:spLocks noRot="1" noChangeAspect="1" noMove="1" noResize="1" noEditPoints="1" noAdjustHandles="1" noChangeArrowheads="1" noChangeShapeType="1" noTextEdit="1"/>
+                </p:cNvSpPr>
+                <p:nvPr/>
+              </p:nvSpPr>
+              <p:spPr>
+                <a:xfrm>
+                  <a:off x="981298" y="951374"/>
+                  <a:ext cx="430183" cy="498990"/>
+                </a:xfrm>
+                <a:prstGeom prst="rect">
+                  <a:avLst/>
+                </a:prstGeom>
+                <a:blipFill rotWithShape="0">
+                  <a:blip r:embed="rId3"/>
+                  <a:stretch>
+                    <a:fillRect r="-7692"/>
+                  </a:stretch>
+                </a:blipFill>
+              </p:spPr>
+              <p:txBody>
+                <a:bodyPr/>
+                <a:lstStyle/>
+                <a:p>
+                  <a:r>
+                    <a:rPr lang="en-GB">
+                      <a:noFill/>
+                    </a:rPr>
+                    <a:t> </a:t>
+                  </a:r>
+                </a:p>
+              </p:txBody>
+            </p:sp>
+          </mc:Fallback>
+        </mc:AlternateContent>
+      </p:grpSp>
       <p:sp>
         <p:nvSpPr>
           <p:cNvPr id="114" name="TextBox 113"/>
@@ -5503,7 +5540,7 @@
         </p:nvSpPr>
         <p:spPr>
           <a:xfrm>
-            <a:off x="3533528" y="3469128"/>
+            <a:off x="3399457" y="3371425"/>
             <a:ext cx="2442272" cy="369332"/>
           </a:xfrm>
           <a:prstGeom prst="rect">

</xml_diff>

<commit_message>
Adjustments to DCM model pics
</commit_message>
<xml_diff>
--- a/theory/dcm/models/DCM model images.pptx
+++ b/theory/dcm/models/DCM model images.pptx
@@ -107,7 +107,18 @@
   </p:defaultTextStyle>
   <p:extLst>
     <p:ext uri="{EFAFB233-063F-42B5-8137-9DF3F51BA10A}">
-      <p15:sldGuideLst xmlns:p15="http://schemas.microsoft.com/office/powerpoint/2012/main"/>
+      <p15:sldGuideLst xmlns:p15="http://schemas.microsoft.com/office/powerpoint/2012/main">
+        <p15:guide id="1" orient="horz" pos="2160" userDrawn="1">
+          <p15:clr>
+            <a:srgbClr val="A4A3A4"/>
+          </p15:clr>
+        </p15:guide>
+        <p15:guide id="2" pos="1323" userDrawn="1">
+          <p15:clr>
+            <a:srgbClr val="A4A3A4"/>
+          </p15:clr>
+        </p15:guide>
+      </p15:sldGuideLst>
     </p:ext>
   </p:extLst>
 </p:presentation>
@@ -244,7 +255,7 @@
           <a:p>
             <a:fld id="{2A3C8AEF-87AC-4489-8DC9-4FDA99D5B8D1}" type="datetimeFigureOut">
               <a:rPr lang="en-GB" smtClean="0"/>
-              <a:t>25/11/2016</a:t>
+              <a:t>28/11/2016</a:t>
             </a:fld>
             <a:endParaRPr lang="en-GB"/>
           </a:p>
@@ -414,7 +425,7 @@
           <a:p>
             <a:fld id="{2A3C8AEF-87AC-4489-8DC9-4FDA99D5B8D1}" type="datetimeFigureOut">
               <a:rPr lang="en-GB" smtClean="0"/>
-              <a:t>25/11/2016</a:t>
+              <a:t>28/11/2016</a:t>
             </a:fld>
             <a:endParaRPr lang="en-GB"/>
           </a:p>
@@ -594,7 +605,7 @@
           <a:p>
             <a:fld id="{2A3C8AEF-87AC-4489-8DC9-4FDA99D5B8D1}" type="datetimeFigureOut">
               <a:rPr lang="en-GB" smtClean="0"/>
-              <a:t>25/11/2016</a:t>
+              <a:t>28/11/2016</a:t>
             </a:fld>
             <a:endParaRPr lang="en-GB"/>
           </a:p>
@@ -764,7 +775,7 @@
           <a:p>
             <a:fld id="{2A3C8AEF-87AC-4489-8DC9-4FDA99D5B8D1}" type="datetimeFigureOut">
               <a:rPr lang="en-GB" smtClean="0"/>
-              <a:t>25/11/2016</a:t>
+              <a:t>28/11/2016</a:t>
             </a:fld>
             <a:endParaRPr lang="en-GB"/>
           </a:p>
@@ -1010,7 +1021,7 @@
           <a:p>
             <a:fld id="{2A3C8AEF-87AC-4489-8DC9-4FDA99D5B8D1}" type="datetimeFigureOut">
               <a:rPr lang="en-GB" smtClean="0"/>
-              <a:t>25/11/2016</a:t>
+              <a:t>28/11/2016</a:t>
             </a:fld>
             <a:endParaRPr lang="en-GB"/>
           </a:p>
@@ -1242,7 +1253,7 @@
           <a:p>
             <a:fld id="{2A3C8AEF-87AC-4489-8DC9-4FDA99D5B8D1}" type="datetimeFigureOut">
               <a:rPr lang="en-GB" smtClean="0"/>
-              <a:t>25/11/2016</a:t>
+              <a:t>28/11/2016</a:t>
             </a:fld>
             <a:endParaRPr lang="en-GB"/>
           </a:p>
@@ -1609,7 +1620,7 @@
           <a:p>
             <a:fld id="{2A3C8AEF-87AC-4489-8DC9-4FDA99D5B8D1}" type="datetimeFigureOut">
               <a:rPr lang="en-GB" smtClean="0"/>
-              <a:t>25/11/2016</a:t>
+              <a:t>28/11/2016</a:t>
             </a:fld>
             <a:endParaRPr lang="en-GB"/>
           </a:p>
@@ -1727,7 +1738,7 @@
           <a:p>
             <a:fld id="{2A3C8AEF-87AC-4489-8DC9-4FDA99D5B8D1}" type="datetimeFigureOut">
               <a:rPr lang="en-GB" smtClean="0"/>
-              <a:t>25/11/2016</a:t>
+              <a:t>28/11/2016</a:t>
             </a:fld>
             <a:endParaRPr lang="en-GB"/>
           </a:p>
@@ -1822,7 +1833,7 @@
           <a:p>
             <a:fld id="{2A3C8AEF-87AC-4489-8DC9-4FDA99D5B8D1}" type="datetimeFigureOut">
               <a:rPr lang="en-GB" smtClean="0"/>
-              <a:t>25/11/2016</a:t>
+              <a:t>28/11/2016</a:t>
             </a:fld>
             <a:endParaRPr lang="en-GB"/>
           </a:p>
@@ -2099,7 +2110,7 @@
           <a:p>
             <a:fld id="{2A3C8AEF-87AC-4489-8DC9-4FDA99D5B8D1}" type="datetimeFigureOut">
               <a:rPr lang="en-GB" smtClean="0"/>
-              <a:t>25/11/2016</a:t>
+              <a:t>28/11/2016</a:t>
             </a:fld>
             <a:endParaRPr lang="en-GB"/>
           </a:p>
@@ -2352,7 +2363,7 @@
           <a:p>
             <a:fld id="{2A3C8AEF-87AC-4489-8DC9-4FDA99D5B8D1}" type="datetimeFigureOut">
               <a:rPr lang="en-GB" smtClean="0"/>
-              <a:t>25/11/2016</a:t>
+              <a:t>28/11/2016</a:t>
             </a:fld>
             <a:endParaRPr lang="en-GB"/>
           </a:p>
@@ -2565,7 +2576,7 @@
           <a:p>
             <a:fld id="{2A3C8AEF-87AC-4489-8DC9-4FDA99D5B8D1}" type="datetimeFigureOut">
               <a:rPr lang="en-GB" smtClean="0"/>
-              <a:t>25/11/2016</a:t>
+              <a:t>28/11/2016</a:t>
             </a:fld>
             <a:endParaRPr lang="en-GB"/>
           </a:p>
@@ -2979,8 +2990,14 @@
           <p:nvPr/>
         </p:nvPicPr>
         <p:blipFill rotWithShape="1">
-          <a:blip r:embed="rId2"/>
-          <a:srcRect l="17155" t="17597" r="22922" b="13722"/>
+          <a:blip r:embed="rId2" cstate="email">
+            <a:extLst>
+              <a:ext uri="{28A0092B-C50C-407E-A947-70E740481C1C}">
+                <a14:useLocalDpi xmlns:a14="http://schemas.microsoft.com/office/drawing/2010/main"/>
+              </a:ext>
+            </a:extLst>
+          </a:blip>
+          <a:srcRect/>
           <a:stretch/>
         </p:blipFill>
         <p:spPr>
@@ -3607,7 +3624,7 @@
               <a:avLst/>
             </a:prstGeom>
             <a:solidFill>
-              <a:srgbClr val="187509"/>
+              <a:srgbClr val="8396C3"/>
             </a:solidFill>
             <a:ln>
               <a:noFill/>
@@ -3696,8 +3713,9 @@
             </a:prstGeom>
             <a:ln w="38100">
               <a:solidFill>
-                <a:srgbClr val="187509"/>
+                <a:srgbClr val="8396C3"/>
               </a:solidFill>
+              <a:prstDash val="solid"/>
               <a:tailEnd type="oval"/>
             </a:ln>
           </p:spPr>
@@ -4984,7 +5002,7 @@
           <p:spPr>
             <a:xfrm>
               <a:off x="1506151" y="768522"/>
-              <a:ext cx="807308" cy="807308"/>
+              <a:ext cx="807309" cy="807309"/>
             </a:xfrm>
             <a:prstGeom prst="ellipse">
               <a:avLst/>
@@ -5305,7 +5323,7 @@
               </p:nvSpPr>
               <p:spPr>
                 <a:xfrm>
-                  <a:off x="981298" y="2475051"/>
+                  <a:off x="1593996" y="2355235"/>
                   <a:ext cx="645682" cy="498990"/>
                 </a:xfrm>
                 <a:prstGeom prst="rect">
@@ -5370,7 +5388,7 @@
               </p:nvSpPr>
               <p:spPr>
                 <a:xfrm>
-                  <a:off x="981298" y="2475051"/>
+                  <a:off x="1593996" y="2355235"/>
                   <a:ext cx="645682" cy="498990"/>
                 </a:xfrm>
                 <a:prstGeom prst="rect">
@@ -5408,7 +5426,7 @@
               </p:nvSpPr>
               <p:spPr>
                 <a:xfrm>
-                  <a:off x="981298" y="951374"/>
+                  <a:off x="1593996" y="887084"/>
                   <a:ext cx="430183" cy="498990"/>
                 </a:xfrm>
                 <a:prstGeom prst="rect">
@@ -5473,7 +5491,7 @@
               </p:nvSpPr>
               <p:spPr>
                 <a:xfrm>
-                  <a:off x="981298" y="951374"/>
+                  <a:off x="1593996" y="887084"/>
                   <a:ext cx="430183" cy="498990"/>
                 </a:xfrm>
                 <a:prstGeom prst="rect">

</xml_diff>

<commit_message>
Created slide with colour scheme and added DCM theory images
</commit_message>
<xml_diff>
--- a/theory/dcm/models/DCM model images.pptx
+++ b/theory/dcm/models/DCM model images.pptx
@@ -5,8 +5,7 @@
     <p:sldMasterId id="2147483648" r:id="rId1"/>
   </p:sldMasterIdLst>
   <p:sldIdLst>
-    <p:sldId id="257" r:id="rId2"/>
-    <p:sldId id="256" r:id="rId3"/>
+    <p:sldId id="256" r:id="rId2"/>
   </p:sldIdLst>
   <p:sldSz cx="12192000" cy="6858000"/>
   <p:notesSz cx="6858000" cy="9144000"/>
@@ -255,7 +254,7 @@
           <a:p>
             <a:fld id="{2A3C8AEF-87AC-4489-8DC9-4FDA99D5B8D1}" type="datetimeFigureOut">
               <a:rPr lang="en-GB" smtClean="0"/>
-              <a:t>28/11/2016</a:t>
+              <a:t>04/05/2017</a:t>
             </a:fld>
             <a:endParaRPr lang="en-GB"/>
           </a:p>
@@ -425,7 +424,7 @@
           <a:p>
             <a:fld id="{2A3C8AEF-87AC-4489-8DC9-4FDA99D5B8D1}" type="datetimeFigureOut">
               <a:rPr lang="en-GB" smtClean="0"/>
-              <a:t>28/11/2016</a:t>
+              <a:t>04/05/2017</a:t>
             </a:fld>
             <a:endParaRPr lang="en-GB"/>
           </a:p>
@@ -605,7 +604,7 @@
           <a:p>
             <a:fld id="{2A3C8AEF-87AC-4489-8DC9-4FDA99D5B8D1}" type="datetimeFigureOut">
               <a:rPr lang="en-GB" smtClean="0"/>
-              <a:t>28/11/2016</a:t>
+              <a:t>04/05/2017</a:t>
             </a:fld>
             <a:endParaRPr lang="en-GB"/>
           </a:p>
@@ -775,7 +774,7 @@
           <a:p>
             <a:fld id="{2A3C8AEF-87AC-4489-8DC9-4FDA99D5B8D1}" type="datetimeFigureOut">
               <a:rPr lang="en-GB" smtClean="0"/>
-              <a:t>28/11/2016</a:t>
+              <a:t>04/05/2017</a:t>
             </a:fld>
             <a:endParaRPr lang="en-GB"/>
           </a:p>
@@ -1021,7 +1020,7 @@
           <a:p>
             <a:fld id="{2A3C8AEF-87AC-4489-8DC9-4FDA99D5B8D1}" type="datetimeFigureOut">
               <a:rPr lang="en-GB" smtClean="0"/>
-              <a:t>28/11/2016</a:t>
+              <a:t>04/05/2017</a:t>
             </a:fld>
             <a:endParaRPr lang="en-GB"/>
           </a:p>
@@ -1253,7 +1252,7 @@
           <a:p>
             <a:fld id="{2A3C8AEF-87AC-4489-8DC9-4FDA99D5B8D1}" type="datetimeFigureOut">
               <a:rPr lang="en-GB" smtClean="0"/>
-              <a:t>28/11/2016</a:t>
+              <a:t>04/05/2017</a:t>
             </a:fld>
             <a:endParaRPr lang="en-GB"/>
           </a:p>
@@ -1620,7 +1619,7 @@
           <a:p>
             <a:fld id="{2A3C8AEF-87AC-4489-8DC9-4FDA99D5B8D1}" type="datetimeFigureOut">
               <a:rPr lang="en-GB" smtClean="0"/>
-              <a:t>28/11/2016</a:t>
+              <a:t>04/05/2017</a:t>
             </a:fld>
             <a:endParaRPr lang="en-GB"/>
           </a:p>
@@ -1738,7 +1737,7 @@
           <a:p>
             <a:fld id="{2A3C8AEF-87AC-4489-8DC9-4FDA99D5B8D1}" type="datetimeFigureOut">
               <a:rPr lang="en-GB" smtClean="0"/>
-              <a:t>28/11/2016</a:t>
+              <a:t>04/05/2017</a:t>
             </a:fld>
             <a:endParaRPr lang="en-GB"/>
           </a:p>
@@ -1833,7 +1832,7 @@
           <a:p>
             <a:fld id="{2A3C8AEF-87AC-4489-8DC9-4FDA99D5B8D1}" type="datetimeFigureOut">
               <a:rPr lang="en-GB" smtClean="0"/>
-              <a:t>28/11/2016</a:t>
+              <a:t>04/05/2017</a:t>
             </a:fld>
             <a:endParaRPr lang="en-GB"/>
           </a:p>
@@ -2110,7 +2109,7 @@
           <a:p>
             <a:fld id="{2A3C8AEF-87AC-4489-8DC9-4FDA99D5B8D1}" type="datetimeFigureOut">
               <a:rPr lang="en-GB" smtClean="0"/>
-              <a:t>28/11/2016</a:t>
+              <a:t>04/05/2017</a:t>
             </a:fld>
             <a:endParaRPr lang="en-GB"/>
           </a:p>
@@ -2363,7 +2362,7 @@
           <a:p>
             <a:fld id="{2A3C8AEF-87AC-4489-8DC9-4FDA99D5B8D1}" type="datetimeFigureOut">
               <a:rPr lang="en-GB" smtClean="0"/>
-              <a:t>28/11/2016</a:t>
+              <a:t>04/05/2017</a:t>
             </a:fld>
             <a:endParaRPr lang="en-GB"/>
           </a:p>
@@ -2576,7 +2575,7 @@
           <a:p>
             <a:fld id="{2A3C8AEF-87AC-4489-8DC9-4FDA99D5B8D1}" type="datetimeFigureOut">
               <a:rPr lang="en-GB" smtClean="0"/>
-              <a:t>28/11/2016</a:t>
+              <a:t>04/05/2017</a:t>
             </a:fld>
             <a:endParaRPr lang="en-GB"/>
           </a:p>
@@ -2981,124 +2980,6 @@
           <a:chExt cx="0" cy="0"/>
         </a:xfrm>
       </p:grpSpPr>
-      <p:pic>
-        <p:nvPicPr>
-          <p:cNvPr id="2" name="Picture 1"/>
-          <p:cNvPicPr>
-            <a:picLocks noChangeAspect="1"/>
-          </p:cNvPicPr>
-          <p:nvPr/>
-        </p:nvPicPr>
-        <p:blipFill rotWithShape="1">
-          <a:blip r:embed="rId2" cstate="email">
-            <a:extLst>
-              <a:ext uri="{28A0092B-C50C-407E-A947-70E740481C1C}">
-                <a14:useLocalDpi xmlns:a14="http://schemas.microsoft.com/office/drawing/2010/main"/>
-              </a:ext>
-            </a:extLst>
-          </a:blip>
-          <a:srcRect/>
-          <a:stretch/>
-        </p:blipFill>
-        <p:spPr>
-          <a:xfrm>
-            <a:off x="4076700" y="477961"/>
-            <a:ext cx="7785100" cy="5626100"/>
-          </a:xfrm>
-          <a:prstGeom prst="rect">
-            <a:avLst/>
-          </a:prstGeom>
-        </p:spPr>
-      </p:pic>
-      <p:sp>
-        <p:nvSpPr>
-          <p:cNvPr id="3" name="Rectangle 2"/>
-          <p:cNvSpPr/>
-          <p:nvPr/>
-        </p:nvSpPr>
-        <p:spPr>
-          <a:xfrm>
-            <a:off x="5227013" y="6371824"/>
-            <a:ext cx="5801973" cy="369332"/>
-          </a:xfrm>
-          <a:prstGeom prst="rect">
-            <a:avLst/>
-          </a:prstGeom>
-        </p:spPr>
-        <p:txBody>
-          <a:bodyPr wrap="none">
-            <a:spAutoFit/>
-          </a:bodyPr>
-          <a:lstStyle/>
-          <a:p>
-            <a:r>
-              <a:rPr lang="en-GB" dirty="0" smtClean="0"/>
-              <a:t>http://paletton.com/#uid=75A0+0kloqebKE5h6utphmqtrhH</a:t>
-            </a:r>
-            <a:endParaRPr lang="en-GB" dirty="0"/>
-          </a:p>
-        </p:txBody>
-      </p:sp>
-      <p:sp>
-        <p:nvSpPr>
-          <p:cNvPr id="4" name="TextBox 3"/>
-          <p:cNvSpPr txBox="1"/>
-          <p:nvPr/>
-        </p:nvSpPr>
-        <p:spPr>
-          <a:xfrm>
-            <a:off x="876300" y="293295"/>
-            <a:ext cx="1663700" cy="369332"/>
-          </a:xfrm>
-          <a:prstGeom prst="rect">
-            <a:avLst/>
-          </a:prstGeom>
-          <a:noFill/>
-        </p:spPr>
-        <p:txBody>
-          <a:bodyPr wrap="square" rtlCol="0">
-            <a:spAutoFit/>
-          </a:bodyPr>
-          <a:lstStyle/>
-          <a:p>
-            <a:r>
-              <a:rPr lang="en-GB" b="1" dirty="0" smtClean="0"/>
-              <a:t>Colour scheme</a:t>
-            </a:r>
-            <a:endParaRPr lang="en-GB" b="1" dirty="0"/>
-          </a:p>
-        </p:txBody>
-      </p:sp>
-    </p:spTree>
-    <p:extLst>
-      <p:ext uri="{BB962C8B-B14F-4D97-AF65-F5344CB8AC3E}">
-        <p14:creationId xmlns:p14="http://schemas.microsoft.com/office/powerpoint/2010/main" val="32750237"/>
-      </p:ext>
-    </p:extLst>
-  </p:cSld>
-  <p:clrMapOvr>
-    <a:masterClrMapping/>
-  </p:clrMapOvr>
-</p:sld>
-</file>
-
-<file path=ppt/slides/slide2.xml><?xml version="1.0" encoding="utf-8"?>
-<p:sld xmlns:a="http://schemas.openxmlformats.org/drawingml/2006/main" xmlns:r="http://schemas.openxmlformats.org/officeDocument/2006/relationships" xmlns:p="http://schemas.openxmlformats.org/presentationml/2006/main">
-  <p:cSld>
-    <p:spTree>
-      <p:nvGrpSpPr>
-        <p:cNvPr id="1" name=""/>
-        <p:cNvGrpSpPr/>
-        <p:nvPr/>
-      </p:nvGrpSpPr>
-      <p:grpSpPr>
-        <a:xfrm>
-          <a:off x="0" y="0"/>
-          <a:ext cx="0" cy="0"/>
-          <a:chOff x="0" y="0"/>
-          <a:chExt cx="0" cy="0"/>
-        </a:xfrm>
-      </p:grpSpPr>
       <p:grpSp>
         <p:nvGrpSpPr>
           <p:cNvPr id="3" name="Group 2"/>
@@ -5313,8 +5194,8 @@
             </a:p>
           </p:txBody>
         </p:sp>
-        <mc:AlternateContent xmlns:mc="http://schemas.openxmlformats.org/markup-compatibility/2006">
-          <mc:Choice xmlns:a14="http://schemas.microsoft.com/office/drawing/2010/main" Requires="a14">
+        <mc:AlternateContent xmlns:mc="http://schemas.openxmlformats.org/markup-compatibility/2006" xmlns:a14="http://schemas.microsoft.com/office/drawing/2010/main">
+          <mc:Choice Requires="a14">
             <p:sp>
               <p:nvSpPr>
                 <p:cNvPr id="110" name="TextBox 109"/>
@@ -5377,7 +5258,7 @@
               </p:txBody>
             </p:sp>
           </mc:Choice>
-          <mc:Fallback>
+          <mc:Fallback xmlns="">
             <p:sp>
               <p:nvSpPr>
                 <p:cNvPr id="110" name="TextBox 109"/>
@@ -5416,8 +5297,8 @@
             </p:sp>
           </mc:Fallback>
         </mc:AlternateContent>
-        <mc:AlternateContent xmlns:mc="http://schemas.openxmlformats.org/markup-compatibility/2006">
-          <mc:Choice xmlns:a14="http://schemas.microsoft.com/office/drawing/2010/main" Requires="a14">
+        <mc:AlternateContent xmlns:mc="http://schemas.openxmlformats.org/markup-compatibility/2006" xmlns:a14="http://schemas.microsoft.com/office/drawing/2010/main">
+          <mc:Choice Requires="a14">
             <p:sp>
               <p:nvSpPr>
                 <p:cNvPr id="111" name="TextBox 110"/>
@@ -5480,7 +5361,7 @@
               </p:txBody>
             </p:sp>
           </mc:Choice>
-          <mc:Fallback>
+          <mc:Fallback xmlns="">
             <p:sp>
               <p:nvSpPr>
                 <p:cNvPr id="111" name="TextBox 110"/>

</xml_diff>